<commit_message>
Documentation Updates added Vector3f shell
</commit_message>
<xml_diff>
--- a/documentation/COMPASS Project Overview.pptx
+++ b/documentation/COMPASS Project Overview.pptx
@@ -5,22 +5,15 @@
     <p:sldMasterId id="2147483684" r:id="rId1"/>
   </p:sldMasterIdLst>
   <p:notesMasterIdLst>
-    <p:notesMasterId r:id="rId15"/>
+    <p:notesMasterId r:id="rId8"/>
   </p:notesMasterIdLst>
   <p:sldIdLst>
     <p:sldId id="256" r:id="rId2"/>
     <p:sldId id="261" r:id="rId3"/>
     <p:sldId id="257" r:id="rId4"/>
     <p:sldId id="263" r:id="rId5"/>
-    <p:sldId id="260" r:id="rId6"/>
-    <p:sldId id="264" r:id="rId7"/>
-    <p:sldId id="265" r:id="rId8"/>
-    <p:sldId id="262" r:id="rId9"/>
-    <p:sldId id="266" r:id="rId10"/>
-    <p:sldId id="268" r:id="rId11"/>
-    <p:sldId id="267" r:id="rId12"/>
-    <p:sldId id="269" r:id="rId13"/>
-    <p:sldId id="270" r:id="rId14"/>
+    <p:sldId id="269" r:id="rId6"/>
+    <p:sldId id="270" r:id="rId7"/>
   </p:sldIdLst>
   <p:sldSz cx="12192000" cy="6858000"/>
   <p:notesSz cx="6858000" cy="9144000"/>
@@ -213,7 +206,7 @@
           <a:p>
             <a:fld id="{D059CC2D-C996-4891-89D6-DDA04078794E}" type="datetimeFigureOut">
               <a:rPr lang="en-US" smtClean="0"/>
-              <a:t>6/29/2017</a:t>
+              <a:t>8/11/2017</a:t>
             </a:fld>
             <a:endParaRPr lang="en-US"/>
           </a:p>
@@ -545,7 +538,7 @@
           <a:p>
             <a:fld id="{02472033-7378-40D6-8FE1-6709E84BCD59}" type="slidenum">
               <a:rPr lang="en-US" smtClean="0"/>
-              <a:t>13</a:t>
+              <a:t>6</a:t>
             </a:fld>
             <a:endParaRPr lang="en-US"/>
           </a:p>
@@ -695,7 +688,7 @@
           <a:p>
             <a:fld id="{C4771BD2-2EDC-4A32-BF37-6474222A526D}" type="datetimeFigureOut">
               <a:rPr lang="en-US" smtClean="0"/>
-              <a:t>6/29/2017</a:t>
+              <a:t>8/11/2017</a:t>
             </a:fld>
             <a:endParaRPr lang="en-US"/>
           </a:p>
@@ -865,7 +858,7 @@
           <a:p>
             <a:fld id="{C4771BD2-2EDC-4A32-BF37-6474222A526D}" type="datetimeFigureOut">
               <a:rPr lang="en-US" smtClean="0"/>
-              <a:t>6/29/2017</a:t>
+              <a:t>8/11/2017</a:t>
             </a:fld>
             <a:endParaRPr lang="en-US"/>
           </a:p>
@@ -1045,7 +1038,7 @@
           <a:p>
             <a:fld id="{C4771BD2-2EDC-4A32-BF37-6474222A526D}" type="datetimeFigureOut">
               <a:rPr lang="en-US" smtClean="0"/>
-              <a:t>6/29/2017</a:t>
+              <a:t>8/11/2017</a:t>
             </a:fld>
             <a:endParaRPr lang="en-US"/>
           </a:p>
@@ -1215,7 +1208,7 @@
           <a:p>
             <a:fld id="{C4771BD2-2EDC-4A32-BF37-6474222A526D}" type="datetimeFigureOut">
               <a:rPr lang="en-US" smtClean="0"/>
-              <a:t>6/29/2017</a:t>
+              <a:t>8/11/2017</a:t>
             </a:fld>
             <a:endParaRPr lang="en-US"/>
           </a:p>
@@ -1461,7 +1454,7 @@
           <a:p>
             <a:fld id="{C4771BD2-2EDC-4A32-BF37-6474222A526D}" type="datetimeFigureOut">
               <a:rPr lang="en-US" smtClean="0"/>
-              <a:t>6/29/2017</a:t>
+              <a:t>8/11/2017</a:t>
             </a:fld>
             <a:endParaRPr lang="en-US"/>
           </a:p>
@@ -1693,7 +1686,7 @@
           <a:p>
             <a:fld id="{C4771BD2-2EDC-4A32-BF37-6474222A526D}" type="datetimeFigureOut">
               <a:rPr lang="en-US" smtClean="0"/>
-              <a:t>6/29/2017</a:t>
+              <a:t>8/11/2017</a:t>
             </a:fld>
             <a:endParaRPr lang="en-US"/>
           </a:p>
@@ -2060,7 +2053,7 @@
           <a:p>
             <a:fld id="{C4771BD2-2EDC-4A32-BF37-6474222A526D}" type="datetimeFigureOut">
               <a:rPr lang="en-US" smtClean="0"/>
-              <a:t>6/29/2017</a:t>
+              <a:t>8/11/2017</a:t>
             </a:fld>
             <a:endParaRPr lang="en-US"/>
           </a:p>
@@ -2178,7 +2171,7 @@
           <a:p>
             <a:fld id="{C4771BD2-2EDC-4A32-BF37-6474222A526D}" type="datetimeFigureOut">
               <a:rPr lang="en-US" smtClean="0"/>
-              <a:t>6/29/2017</a:t>
+              <a:t>8/11/2017</a:t>
             </a:fld>
             <a:endParaRPr lang="en-US"/>
           </a:p>
@@ -2273,7 +2266,7 @@
           <a:p>
             <a:fld id="{C4771BD2-2EDC-4A32-BF37-6474222A526D}" type="datetimeFigureOut">
               <a:rPr lang="en-US" smtClean="0"/>
-              <a:t>6/29/2017</a:t>
+              <a:t>8/11/2017</a:t>
             </a:fld>
             <a:endParaRPr lang="en-US"/>
           </a:p>
@@ -2550,7 +2543,7 @@
           <a:p>
             <a:fld id="{C4771BD2-2EDC-4A32-BF37-6474222A526D}" type="datetimeFigureOut">
               <a:rPr lang="en-US" smtClean="0"/>
-              <a:t>6/29/2017</a:t>
+              <a:t>8/11/2017</a:t>
             </a:fld>
             <a:endParaRPr lang="en-US"/>
           </a:p>
@@ -2807,7 +2800,7 @@
           <a:p>
             <a:fld id="{C4771BD2-2EDC-4A32-BF37-6474222A526D}" type="datetimeFigureOut">
               <a:rPr lang="en-US" smtClean="0"/>
-              <a:t>6/29/2017</a:t>
+              <a:t>8/11/2017</a:t>
             </a:fld>
             <a:endParaRPr lang="en-US"/>
           </a:p>
@@ -3020,7 +3013,7 @@
           <a:p>
             <a:fld id="{C4771BD2-2EDC-4A32-BF37-6474222A526D}" type="datetimeFigureOut">
               <a:rPr lang="en-US" smtClean="0"/>
-              <a:t>6/29/2017</a:t>
+              <a:t>8/11/2017</a:t>
             </a:fld>
             <a:endParaRPr lang="en-US"/>
           </a:p>
@@ -3554,9 +3547,17 @@
 </p:sld>
 </file>
 
-<file path=ppt/slides/slide10.xml><?xml version="1.0" encoding="utf-8"?>
+<file path=ppt/slides/slide2.xml><?xml version="1.0" encoding="utf-8"?>
 <p:sld xmlns:a="http://schemas.openxmlformats.org/drawingml/2006/main" xmlns:r="http://schemas.openxmlformats.org/officeDocument/2006/relationships" xmlns:p="http://schemas.openxmlformats.org/presentationml/2006/main">
   <p:cSld>
+    <p:bg>
+      <p:bgPr>
+        <a:solidFill>
+          <a:schemeClr val="bg1"/>
+        </a:solidFill>
+        <a:effectLst/>
+      </p:bgPr>
+    </p:bg>
     <p:spTree>
       <p:nvGrpSpPr>
         <p:cNvPr id="1" name=""/>
@@ -3588,7 +3589,7 @@
           <a:p>
             <a:r>
               <a:rPr lang="en-US" dirty="0"/>
-              <a:t>Solution Discussion</a:t>
+              <a:t>Overview</a:t>
             </a:r>
           </a:p>
         </p:txBody>
@@ -3612,35 +3613,47 @@
           <a:p>
             <a:r>
               <a:rPr lang="en-US" dirty="0"/>
-              <a:t>User Interface:</a:t>
-            </a:r>
-          </a:p>
-          <a:p>
-            <a:pPr lvl="1"/>
+              <a:t>The </a:t>
+            </a:r>
+            <a:r>
+              <a:rPr lang="en-US" b="1" dirty="0"/>
+              <a:t>Com</a:t>
+            </a:r>
             <a:r>
               <a:rPr lang="en-US" dirty="0"/>
-              <a:t>Load a model of an RSO and its TLE into the program</a:t>
-            </a:r>
-          </a:p>
-          <a:p>
-            <a:pPr lvl="1"/>
+              <a:t>putational </a:t>
+            </a:r>
+            <a:r>
+              <a:rPr lang="en-US" b="1" dirty="0"/>
+              <a:t>P</a:t>
+            </a:r>
             <a:r>
               <a:rPr lang="en-US" dirty="0"/>
-              <a:t>Specify simulation parameters and render immediately (No photometry data generated) according to rotation/orientation parameters from the user</a:t>
-            </a:r>
-          </a:p>
-          <a:p>
-            <a:pPr lvl="1"/>
+              <a:t>hotometric-Characterizer/Analyzer for </a:t>
+            </a:r>
+            <a:r>
+              <a:rPr lang="en-US" b="1" dirty="0"/>
+              <a:t>A</a:t>
+            </a:r>
             <a:r>
               <a:rPr lang="en-US" dirty="0"/>
-              <a:t>User can load an RSO, TLE, rotation/orientation, and time parameters and run a simulation to generate a photometry curve. This photometry curve can be viewed side-by-side with a rendering of the RSO to provide a means of visually correlating the data to the orientation of the RSO. </a:t>
-            </a:r>
-          </a:p>
-          <a:p>
-            <a:pPr lvl="1"/>
+              <a:t>rtificial </a:t>
+            </a:r>
+            <a:r>
+              <a:rPr lang="en-US" b="1" dirty="0"/>
+              <a:t>S</a:t>
+            </a:r>
             <a:r>
               <a:rPr lang="en-US" dirty="0"/>
-              <a:t>User can load an RSO model, TLE, and time-stamped photometry curve and the program will attempt to reconstruct the RSO’s orientation/rotation. It will produce a visual rendering of the RSO based on the input data. </a:t>
+              <a:t>atellite</a:t>
+            </a:r>
+            <a:r>
+              <a:rPr lang="en-US" b="1" dirty="0"/>
+              <a:t>s</a:t>
+            </a:r>
+            <a:r>
+              <a:rPr lang="en-US" dirty="0"/>
+              <a:t> (COMPASS) is a desktop-based rendering engine written in C++ and OpenGL to produce highly accurate graphical representations of RSOs (resident space objects) and their environments as observed by ground-based telescopes. These renderings are generated and processed within the program in order to infer additional information about the system (photometry curve, attitude, rotation, etc.) and provide the user with a convenient and intuitive interface which can be used to visualize the RSO and directly correlate these visualizations to photometry data within the simulations.</a:t>
             </a:r>
           </a:p>
         </p:txBody>
@@ -3708,7 +3721,7 @@
     </p:spTree>
     <p:extLst>
       <p:ext uri="{BB962C8B-B14F-4D97-AF65-F5344CB8AC3E}">
-        <p14:creationId xmlns:p14="http://schemas.microsoft.com/office/powerpoint/2010/main" val="1827993723"/>
+        <p14:creationId xmlns:p14="http://schemas.microsoft.com/office/powerpoint/2010/main" val="1638093542"/>
       </p:ext>
     </p:extLst>
   </p:cSld>
@@ -3718,7 +3731,7 @@
 </p:sld>
 </file>
 
-<file path=ppt/slides/slide11.xml><?xml version="1.0" encoding="utf-8"?>
+<file path=ppt/slides/slide3.xml><?xml version="1.0" encoding="utf-8"?>
 <p:sld xmlns:a="http://schemas.openxmlformats.org/drawingml/2006/main" xmlns:r="http://schemas.openxmlformats.org/officeDocument/2006/relationships" xmlns:p="http://schemas.openxmlformats.org/presentationml/2006/main">
   <p:cSld>
     <p:spTree>
@@ -3752,7 +3765,7 @@
           <a:p>
             <a:r>
               <a:rPr lang="en-US" dirty="0"/>
-              <a:t>Solution Discussion</a:t>
+              <a:t>High-Level Requirements</a:t>
             </a:r>
           </a:p>
         </p:txBody>
@@ -3770,30 +3783,67 @@
         <p:spPr/>
         <p:txBody>
           <a:bodyPr>
-            <a:normAutofit/>
+            <a:normAutofit lnSpcReduction="10000"/>
           </a:bodyPr>
           <a:lstStyle/>
           <a:p>
             <a:r>
               <a:rPr lang="en-US" dirty="0"/>
-              <a:t>Shape Determination:</a:t>
-            </a:r>
-          </a:p>
-          <a:p>
-            <a:pPr lvl="1"/>
+              <a:t>Primary Requirements:</a:t>
+            </a:r>
+          </a:p>
+          <a:p>
+            <a:pPr marL="971550" lvl="1" indent="-514350">
+              <a:buFont typeface="+mj-lt"/>
+              <a:buAutoNum type="arabicPeriod"/>
+            </a:pPr>
             <a:r>
               <a:rPr lang="en-US" dirty="0"/>
-              <a:t>Have not looked into this yet. I have no clue at this point :p</a:t>
-            </a:r>
-          </a:p>
-          <a:p>
-            <a:endParaRPr lang="en-US" dirty="0"/>
+              <a:t>The program shall have the ability to accurately produce high-fidelity renderings of RSOs in low-earth orbit and use these renderings to produce photometry curves from the perspective of an earth-based observer.</a:t>
+            </a:r>
+          </a:p>
+          <a:p>
+            <a:pPr marL="971550" lvl="1" indent="-514350">
+              <a:buFont typeface="+mj-lt"/>
+              <a:buAutoNum type="arabicPeriod"/>
+            </a:pPr>
+            <a:r>
+              <a:rPr lang="en-US" dirty="0"/>
+              <a:t>The program shall have the ability to reconstruct the attitude and angular motion of an RSO given its shape, orbital parameters, and photometry curve.</a:t>
+            </a:r>
+          </a:p>
+          <a:p>
+            <a:pPr marL="971550" lvl="1" indent="-514350">
+              <a:buFont typeface="+mj-lt"/>
+              <a:buAutoNum type="arabicPeriod"/>
+            </a:pPr>
+            <a:r>
+              <a:rPr lang="en-US" dirty="0"/>
+              <a:t>The program shall provide a graphical user interface through which the user may specify simulation parameters, run simulations, and observe/interact with renderings and photometry data.</a:t>
+            </a:r>
+          </a:p>
+          <a:p>
+            <a:pPr marL="342900" lvl="1" indent="-342900"/>
+            <a:r>
+              <a:rPr lang="en-US" dirty="0"/>
+              <a:t>Secondary Requirement:</a:t>
+            </a:r>
+          </a:p>
+          <a:p>
+            <a:pPr marL="914400" lvl="2" indent="-457200">
+              <a:buFont typeface="+mj-lt"/>
+              <a:buAutoNum type="arabicPeriod"/>
+            </a:pPr>
+            <a:r>
+              <a:rPr lang="en-US" sz="2400" dirty="0"/>
+              <a:t>The program shall have the ability to reconstruct the shape and attitude of an RSO given its orbital parameters and photometry curve. </a:t>
+            </a:r>
           </a:p>
         </p:txBody>
       </p:sp>
       <p:pic>
         <p:nvPicPr>
-          <p:cNvPr id="4" name="Picture 3"/>
+          <p:cNvPr id="6" name="Picture 5"/>
           <p:cNvPicPr>
             <a:picLocks noChangeAspect="1"/>
           </p:cNvPicPr>
@@ -3823,7 +3873,7 @@
       </p:pic>
       <p:pic>
         <p:nvPicPr>
-          <p:cNvPr id="5" name="Picture 4"/>
+          <p:cNvPr id="7" name="Picture 6"/>
           <p:cNvPicPr>
             <a:picLocks noChangeAspect="1"/>
           </p:cNvPicPr>
@@ -3854,7 +3904,7 @@
     </p:spTree>
     <p:extLst>
       <p:ext uri="{BB962C8B-B14F-4D97-AF65-F5344CB8AC3E}">
-        <p14:creationId xmlns:p14="http://schemas.microsoft.com/office/powerpoint/2010/main" val="1351818165"/>
+        <p14:creationId xmlns:p14="http://schemas.microsoft.com/office/powerpoint/2010/main" val="3696085377"/>
       </p:ext>
     </p:extLst>
   </p:cSld>
@@ -3864,7 +3914,155 @@
 </p:sld>
 </file>
 
-<file path=ppt/slides/slide12.xml><?xml version="1.0" encoding="utf-8"?>
+<file path=ppt/slides/slide4.xml><?xml version="1.0" encoding="utf-8"?>
+<p:sld xmlns:a="http://schemas.openxmlformats.org/drawingml/2006/main" xmlns:r="http://schemas.openxmlformats.org/officeDocument/2006/relationships" xmlns:p="http://schemas.openxmlformats.org/presentationml/2006/main">
+  <p:cSld>
+    <p:spTree>
+      <p:nvGrpSpPr>
+        <p:cNvPr id="1" name=""/>
+        <p:cNvGrpSpPr/>
+        <p:nvPr/>
+      </p:nvGrpSpPr>
+      <p:grpSpPr>
+        <a:xfrm>
+          <a:off x="0" y="0"/>
+          <a:ext cx="0" cy="0"/>
+          <a:chOff x="0" y="0"/>
+          <a:chExt cx="0" cy="0"/>
+        </a:xfrm>
+      </p:grpSpPr>
+      <p:sp>
+        <p:nvSpPr>
+          <p:cNvPr id="2" name="Title 1"/>
+          <p:cNvSpPr>
+            <a:spLocks noGrp="1"/>
+          </p:cNvSpPr>
+          <p:nvPr>
+            <p:ph type="title"/>
+          </p:nvPr>
+        </p:nvSpPr>
+        <p:spPr/>
+        <p:txBody>
+          <a:bodyPr/>
+          <a:lstStyle/>
+          <a:p>
+            <a:r>
+              <a:rPr lang="en-US" dirty="0"/>
+              <a:t>Additional Implementations</a:t>
+            </a:r>
+          </a:p>
+        </p:txBody>
+      </p:sp>
+      <p:sp>
+        <p:nvSpPr>
+          <p:cNvPr id="3" name="Content Placeholder 2"/>
+          <p:cNvSpPr>
+            <a:spLocks noGrp="1"/>
+          </p:cNvSpPr>
+          <p:nvPr>
+            <p:ph idx="1"/>
+          </p:nvPr>
+        </p:nvSpPr>
+        <p:spPr/>
+        <p:txBody>
+          <a:bodyPr>
+            <a:normAutofit/>
+          </a:bodyPr>
+          <a:lstStyle/>
+          <a:p>
+            <a:r>
+              <a:rPr lang="en-US" dirty="0"/>
+              <a:t>OSCOM simulator and testing platform. Virtually implementing new utilities/techniques within OSCOM such as OpenCV applications (automatic tracking software) or new equipment (simulate filters, telescope optics, cameras, etc.). </a:t>
+            </a:r>
+          </a:p>
+          <a:p>
+            <a:r>
+              <a:rPr lang="en-US" dirty="0"/>
+              <a:t>Research aid. Provides a more intuitive understanding of how spacecraft configurations (orbit, attitude, rotation, etc.) correlate to light curve data and provide a means of interacting with the scenario to quickly and easily test/explore new ideas. </a:t>
+            </a:r>
+          </a:p>
+          <a:p>
+            <a:r>
+              <a:rPr lang="en-US" dirty="0"/>
+              <a:t>CubeSat development. Test CubeSat models and configurations within the software in order to optimize their design for use with OSCOM. </a:t>
+            </a:r>
+          </a:p>
+        </p:txBody>
+      </p:sp>
+      <p:pic>
+        <p:nvPicPr>
+          <p:cNvPr id="4" name="Picture 3"/>
+          <p:cNvPicPr>
+            <a:picLocks noChangeAspect="1"/>
+          </p:cNvPicPr>
+          <p:nvPr/>
+        </p:nvPicPr>
+        <p:blipFill>
+          <a:blip r:embed="rId2">
+            <a:extLst>
+              <a:ext uri="{28A0092B-C50C-407E-A947-70E740481C1C}">
+                <a14:useLocalDpi xmlns:a14="http://schemas.microsoft.com/office/drawing/2010/main" val="0"/>
+              </a:ext>
+            </a:extLst>
+          </a:blip>
+          <a:stretch>
+            <a:fillRect/>
+          </a:stretch>
+        </p:blipFill>
+        <p:spPr>
+          <a:xfrm>
+            <a:off x="10501312" y="0"/>
+            <a:ext cx="1690688" cy="1690688"/>
+          </a:xfrm>
+          <a:prstGeom prst="rect">
+            <a:avLst/>
+          </a:prstGeom>
+        </p:spPr>
+      </p:pic>
+      <p:pic>
+        <p:nvPicPr>
+          <p:cNvPr id="5" name="Picture 4"/>
+          <p:cNvPicPr>
+            <a:picLocks noChangeAspect="1"/>
+          </p:cNvPicPr>
+          <p:nvPr/>
+        </p:nvPicPr>
+        <p:blipFill>
+          <a:blip r:embed="rId3">
+            <a:extLst>
+              <a:ext uri="{28A0092B-C50C-407E-A947-70E740481C1C}">
+                <a14:useLocalDpi xmlns:a14="http://schemas.microsoft.com/office/drawing/2010/main" val="0"/>
+              </a:ext>
+            </a:extLst>
+          </a:blip>
+          <a:stretch>
+            <a:fillRect/>
+          </a:stretch>
+        </p:blipFill>
+        <p:spPr>
+          <a:xfrm>
+            <a:off x="10416742" y="5822874"/>
+            <a:ext cx="1775258" cy="1035126"/>
+          </a:xfrm>
+          <a:prstGeom prst="rect">
+            <a:avLst/>
+          </a:prstGeom>
+        </p:spPr>
+      </p:pic>
+    </p:spTree>
+    <p:extLst>
+      <p:ext uri="{BB962C8B-B14F-4D97-AF65-F5344CB8AC3E}">
+        <p14:creationId xmlns:p14="http://schemas.microsoft.com/office/powerpoint/2010/main" val="2537404502"/>
+      </p:ext>
+    </p:extLst>
+  </p:cSld>
+  <p:clrMapOvr>
+    <a:masterClrMapping/>
+  </p:clrMapOvr>
+</p:sld>
+</file>
+
+<file path=ppt/slides/slide5.xml><?xml version="1.0" encoding="utf-8"?>
 <p:sld xmlns:a="http://schemas.openxmlformats.org/drawingml/2006/main" xmlns:r="http://schemas.openxmlformats.org/officeDocument/2006/relationships" xmlns:p="http://schemas.openxmlformats.org/presentationml/2006/main">
   <p:cSld>
     <p:spTree>
@@ -4058,7 +4256,7 @@
 </p:sld>
 </file>
 
-<file path=ppt/slides/slide13.xml><?xml version="1.0" encoding="utf-8"?>
+<file path=ppt/slides/slide6.xml><?xml version="1.0" encoding="utf-8"?>
 <p:sld xmlns:a="http://schemas.openxmlformats.org/drawingml/2006/main" xmlns:r="http://schemas.openxmlformats.org/officeDocument/2006/relationships" xmlns:p="http://schemas.openxmlformats.org/presentationml/2006/main">
   <p:cSld>
     <p:spTree>
@@ -5441,1410 +5639,6 @@
 </p:sld>
 </file>
 
-<file path=ppt/slides/slide2.xml><?xml version="1.0" encoding="utf-8"?>
-<p:sld xmlns:a="http://schemas.openxmlformats.org/drawingml/2006/main" xmlns:r="http://schemas.openxmlformats.org/officeDocument/2006/relationships" xmlns:p="http://schemas.openxmlformats.org/presentationml/2006/main">
-  <p:cSld>
-    <p:bg>
-      <p:bgPr>
-        <a:solidFill>
-          <a:schemeClr val="bg1"/>
-        </a:solidFill>
-        <a:effectLst/>
-      </p:bgPr>
-    </p:bg>
-    <p:spTree>
-      <p:nvGrpSpPr>
-        <p:cNvPr id="1" name=""/>
-        <p:cNvGrpSpPr/>
-        <p:nvPr/>
-      </p:nvGrpSpPr>
-      <p:grpSpPr>
-        <a:xfrm>
-          <a:off x="0" y="0"/>
-          <a:ext cx="0" cy="0"/>
-          <a:chOff x="0" y="0"/>
-          <a:chExt cx="0" cy="0"/>
-        </a:xfrm>
-      </p:grpSpPr>
-      <p:sp>
-        <p:nvSpPr>
-          <p:cNvPr id="2" name="Title 1"/>
-          <p:cNvSpPr>
-            <a:spLocks noGrp="1"/>
-          </p:cNvSpPr>
-          <p:nvPr>
-            <p:ph type="title"/>
-          </p:nvPr>
-        </p:nvSpPr>
-        <p:spPr/>
-        <p:txBody>
-          <a:bodyPr/>
-          <a:lstStyle/>
-          <a:p>
-            <a:r>
-              <a:rPr lang="en-US" dirty="0"/>
-              <a:t>Overview</a:t>
-            </a:r>
-          </a:p>
-        </p:txBody>
-      </p:sp>
-      <p:sp>
-        <p:nvSpPr>
-          <p:cNvPr id="3" name="Content Placeholder 2"/>
-          <p:cNvSpPr>
-            <a:spLocks noGrp="1"/>
-          </p:cNvSpPr>
-          <p:nvPr>
-            <p:ph idx="1"/>
-          </p:nvPr>
-        </p:nvSpPr>
-        <p:spPr/>
-        <p:txBody>
-          <a:bodyPr>
-            <a:normAutofit/>
-          </a:bodyPr>
-          <a:lstStyle/>
-          <a:p>
-            <a:r>
-              <a:rPr lang="en-US" dirty="0"/>
-              <a:t>The </a:t>
-            </a:r>
-            <a:r>
-              <a:rPr lang="en-US" b="1" dirty="0"/>
-              <a:t>Com</a:t>
-            </a:r>
-            <a:r>
-              <a:rPr lang="en-US" dirty="0"/>
-              <a:t>putational </a:t>
-            </a:r>
-            <a:r>
-              <a:rPr lang="en-US" b="1" dirty="0"/>
-              <a:t>P</a:t>
-            </a:r>
-            <a:r>
-              <a:rPr lang="en-US" dirty="0"/>
-              <a:t>hotometric-Characterizer/Analyzer for </a:t>
-            </a:r>
-            <a:r>
-              <a:rPr lang="en-US" b="1" dirty="0"/>
-              <a:t>A</a:t>
-            </a:r>
-            <a:r>
-              <a:rPr lang="en-US" dirty="0"/>
-              <a:t>rtificial </a:t>
-            </a:r>
-            <a:r>
-              <a:rPr lang="en-US" b="1" dirty="0"/>
-              <a:t>S</a:t>
-            </a:r>
-            <a:r>
-              <a:rPr lang="en-US" dirty="0"/>
-              <a:t>atellite</a:t>
-            </a:r>
-            <a:r>
-              <a:rPr lang="en-US" b="1" dirty="0"/>
-              <a:t>s</a:t>
-            </a:r>
-            <a:r>
-              <a:rPr lang="en-US" dirty="0"/>
-              <a:t> (COMPASS) is a desktop-based rendering engine written in C++/OpenGL to produce highly accurate graphical representations of RSOs (resident space objects) and their environments as observed by ground-based telescopes. These renderings are generated and processed within the program in order to infer additional information about the system (photometry curve, attitude, rotation, etc.) and provide the user with a convenient and intuitive interface which can be used to visualize the RSO and directly correlate these visualizations to photometry data within the simulations.</a:t>
-            </a:r>
-          </a:p>
-        </p:txBody>
-      </p:sp>
-      <p:pic>
-        <p:nvPicPr>
-          <p:cNvPr id="4" name="Picture 3"/>
-          <p:cNvPicPr>
-            <a:picLocks noChangeAspect="1"/>
-          </p:cNvPicPr>
-          <p:nvPr/>
-        </p:nvPicPr>
-        <p:blipFill>
-          <a:blip r:embed="rId2">
-            <a:extLst>
-              <a:ext uri="{28A0092B-C50C-407E-A947-70E740481C1C}">
-                <a14:useLocalDpi xmlns:a14="http://schemas.microsoft.com/office/drawing/2010/main" val="0"/>
-              </a:ext>
-            </a:extLst>
-          </a:blip>
-          <a:stretch>
-            <a:fillRect/>
-          </a:stretch>
-        </p:blipFill>
-        <p:spPr>
-          <a:xfrm>
-            <a:off x="10416742" y="5822874"/>
-            <a:ext cx="1775258" cy="1035126"/>
-          </a:xfrm>
-          <a:prstGeom prst="rect">
-            <a:avLst/>
-          </a:prstGeom>
-        </p:spPr>
-      </p:pic>
-      <p:pic>
-        <p:nvPicPr>
-          <p:cNvPr id="5" name="Picture 4"/>
-          <p:cNvPicPr>
-            <a:picLocks noChangeAspect="1"/>
-          </p:cNvPicPr>
-          <p:nvPr/>
-        </p:nvPicPr>
-        <p:blipFill>
-          <a:blip r:embed="rId3">
-            <a:extLst>
-              <a:ext uri="{28A0092B-C50C-407E-A947-70E740481C1C}">
-                <a14:useLocalDpi xmlns:a14="http://schemas.microsoft.com/office/drawing/2010/main" val="0"/>
-              </a:ext>
-            </a:extLst>
-          </a:blip>
-          <a:stretch>
-            <a:fillRect/>
-          </a:stretch>
-        </p:blipFill>
-        <p:spPr>
-          <a:xfrm>
-            <a:off x="10501312" y="0"/>
-            <a:ext cx="1690688" cy="1690688"/>
-          </a:xfrm>
-          <a:prstGeom prst="rect">
-            <a:avLst/>
-          </a:prstGeom>
-        </p:spPr>
-      </p:pic>
-    </p:spTree>
-    <p:extLst>
-      <p:ext uri="{BB962C8B-B14F-4D97-AF65-F5344CB8AC3E}">
-        <p14:creationId xmlns:p14="http://schemas.microsoft.com/office/powerpoint/2010/main" val="1638093542"/>
-      </p:ext>
-    </p:extLst>
-  </p:cSld>
-  <p:clrMapOvr>
-    <a:masterClrMapping/>
-  </p:clrMapOvr>
-</p:sld>
-</file>
-
-<file path=ppt/slides/slide3.xml><?xml version="1.0" encoding="utf-8"?>
-<p:sld xmlns:a="http://schemas.openxmlformats.org/drawingml/2006/main" xmlns:r="http://schemas.openxmlformats.org/officeDocument/2006/relationships" xmlns:p="http://schemas.openxmlformats.org/presentationml/2006/main">
-  <p:cSld>
-    <p:spTree>
-      <p:nvGrpSpPr>
-        <p:cNvPr id="1" name=""/>
-        <p:cNvGrpSpPr/>
-        <p:nvPr/>
-      </p:nvGrpSpPr>
-      <p:grpSpPr>
-        <a:xfrm>
-          <a:off x="0" y="0"/>
-          <a:ext cx="0" cy="0"/>
-          <a:chOff x="0" y="0"/>
-          <a:chExt cx="0" cy="0"/>
-        </a:xfrm>
-      </p:grpSpPr>
-      <p:sp>
-        <p:nvSpPr>
-          <p:cNvPr id="2" name="Title 1"/>
-          <p:cNvSpPr>
-            <a:spLocks noGrp="1"/>
-          </p:cNvSpPr>
-          <p:nvPr>
-            <p:ph type="title"/>
-          </p:nvPr>
-        </p:nvSpPr>
-        <p:spPr/>
-        <p:txBody>
-          <a:bodyPr/>
-          <a:lstStyle/>
-          <a:p>
-            <a:r>
-              <a:rPr lang="en-US" dirty="0"/>
-              <a:t>High-Level Requirements</a:t>
-            </a:r>
-          </a:p>
-        </p:txBody>
-      </p:sp>
-      <p:sp>
-        <p:nvSpPr>
-          <p:cNvPr id="3" name="Content Placeholder 2"/>
-          <p:cNvSpPr>
-            <a:spLocks noGrp="1"/>
-          </p:cNvSpPr>
-          <p:nvPr>
-            <p:ph idx="1"/>
-          </p:nvPr>
-        </p:nvSpPr>
-        <p:spPr/>
-        <p:txBody>
-          <a:bodyPr>
-            <a:normAutofit lnSpcReduction="10000"/>
-          </a:bodyPr>
-          <a:lstStyle/>
-          <a:p>
-            <a:r>
-              <a:rPr lang="en-US" dirty="0"/>
-              <a:t>Primary Requirements:</a:t>
-            </a:r>
-          </a:p>
-          <a:p>
-            <a:pPr marL="971550" lvl="1" indent="-514350">
-              <a:buFont typeface="+mj-lt"/>
-              <a:buAutoNum type="arabicPeriod"/>
-            </a:pPr>
-            <a:r>
-              <a:rPr lang="en-US" dirty="0"/>
-              <a:t>The program shall have the ability to accurately produce high-fidelity renderings of RSOs in low-earth orbit and use these renderings to produce photometry curves from the perspective of an earth-based observer.</a:t>
-            </a:r>
-          </a:p>
-          <a:p>
-            <a:pPr marL="971550" lvl="1" indent="-514350">
-              <a:buFont typeface="+mj-lt"/>
-              <a:buAutoNum type="arabicPeriod"/>
-            </a:pPr>
-            <a:r>
-              <a:rPr lang="en-US" dirty="0"/>
-              <a:t>The program shall have the ability to reconstruct the attitude and angular motion of an RSO given its shape, orbital parameters, and photometry curve.</a:t>
-            </a:r>
-          </a:p>
-          <a:p>
-            <a:pPr marL="971550" lvl="1" indent="-514350">
-              <a:buFont typeface="+mj-lt"/>
-              <a:buAutoNum type="arabicPeriod"/>
-            </a:pPr>
-            <a:r>
-              <a:rPr lang="en-US" dirty="0"/>
-              <a:t>The program shall provide a graphical user interface through which the user may specify simulation parameters, run simulations, and observe/interact with renderings and photometry data.</a:t>
-            </a:r>
-          </a:p>
-          <a:p>
-            <a:pPr marL="342900" lvl="1" indent="-342900"/>
-            <a:r>
-              <a:rPr lang="en-US" dirty="0"/>
-              <a:t>Secondary Requirement:</a:t>
-            </a:r>
-          </a:p>
-          <a:p>
-            <a:pPr marL="914400" lvl="2" indent="-457200">
-              <a:buFont typeface="+mj-lt"/>
-              <a:buAutoNum type="arabicPeriod"/>
-            </a:pPr>
-            <a:r>
-              <a:rPr lang="en-US" sz="2400" dirty="0"/>
-              <a:t>The program shall have the ability to reconstruct the shape and attitude of an RSO given its orbital parameters and photometry curve. </a:t>
-            </a:r>
-          </a:p>
-        </p:txBody>
-      </p:sp>
-      <p:pic>
-        <p:nvPicPr>
-          <p:cNvPr id="6" name="Picture 5"/>
-          <p:cNvPicPr>
-            <a:picLocks noChangeAspect="1"/>
-          </p:cNvPicPr>
-          <p:nvPr/>
-        </p:nvPicPr>
-        <p:blipFill>
-          <a:blip r:embed="rId2">
-            <a:extLst>
-              <a:ext uri="{28A0092B-C50C-407E-A947-70E740481C1C}">
-                <a14:useLocalDpi xmlns:a14="http://schemas.microsoft.com/office/drawing/2010/main" val="0"/>
-              </a:ext>
-            </a:extLst>
-          </a:blip>
-          <a:stretch>
-            <a:fillRect/>
-          </a:stretch>
-        </p:blipFill>
-        <p:spPr>
-          <a:xfrm>
-            <a:off x="10416742" y="5822874"/>
-            <a:ext cx="1775258" cy="1035126"/>
-          </a:xfrm>
-          <a:prstGeom prst="rect">
-            <a:avLst/>
-          </a:prstGeom>
-        </p:spPr>
-      </p:pic>
-      <p:pic>
-        <p:nvPicPr>
-          <p:cNvPr id="7" name="Picture 6"/>
-          <p:cNvPicPr>
-            <a:picLocks noChangeAspect="1"/>
-          </p:cNvPicPr>
-          <p:nvPr/>
-        </p:nvPicPr>
-        <p:blipFill>
-          <a:blip r:embed="rId3">
-            <a:extLst>
-              <a:ext uri="{28A0092B-C50C-407E-A947-70E740481C1C}">
-                <a14:useLocalDpi xmlns:a14="http://schemas.microsoft.com/office/drawing/2010/main" val="0"/>
-              </a:ext>
-            </a:extLst>
-          </a:blip>
-          <a:stretch>
-            <a:fillRect/>
-          </a:stretch>
-        </p:blipFill>
-        <p:spPr>
-          <a:xfrm>
-            <a:off x="10501312" y="0"/>
-            <a:ext cx="1690688" cy="1690688"/>
-          </a:xfrm>
-          <a:prstGeom prst="rect">
-            <a:avLst/>
-          </a:prstGeom>
-        </p:spPr>
-      </p:pic>
-    </p:spTree>
-    <p:extLst>
-      <p:ext uri="{BB962C8B-B14F-4D97-AF65-F5344CB8AC3E}">
-        <p14:creationId xmlns:p14="http://schemas.microsoft.com/office/powerpoint/2010/main" val="3696085377"/>
-      </p:ext>
-    </p:extLst>
-  </p:cSld>
-  <p:clrMapOvr>
-    <a:masterClrMapping/>
-  </p:clrMapOvr>
-</p:sld>
-</file>
-
-<file path=ppt/slides/slide4.xml><?xml version="1.0" encoding="utf-8"?>
-<p:sld xmlns:a="http://schemas.openxmlformats.org/drawingml/2006/main" xmlns:r="http://schemas.openxmlformats.org/officeDocument/2006/relationships" xmlns:p="http://schemas.openxmlformats.org/presentationml/2006/main">
-  <p:cSld>
-    <p:spTree>
-      <p:nvGrpSpPr>
-        <p:cNvPr id="1" name=""/>
-        <p:cNvGrpSpPr/>
-        <p:nvPr/>
-      </p:nvGrpSpPr>
-      <p:grpSpPr>
-        <a:xfrm>
-          <a:off x="0" y="0"/>
-          <a:ext cx="0" cy="0"/>
-          <a:chOff x="0" y="0"/>
-          <a:chExt cx="0" cy="0"/>
-        </a:xfrm>
-      </p:grpSpPr>
-      <p:sp>
-        <p:nvSpPr>
-          <p:cNvPr id="2" name="Title 1"/>
-          <p:cNvSpPr>
-            <a:spLocks noGrp="1"/>
-          </p:cNvSpPr>
-          <p:nvPr>
-            <p:ph type="title"/>
-          </p:nvPr>
-        </p:nvSpPr>
-        <p:spPr/>
-        <p:txBody>
-          <a:bodyPr/>
-          <a:lstStyle/>
-          <a:p>
-            <a:r>
-              <a:rPr lang="en-US" dirty="0"/>
-              <a:t>Additional Implementations</a:t>
-            </a:r>
-          </a:p>
-        </p:txBody>
-      </p:sp>
-      <p:sp>
-        <p:nvSpPr>
-          <p:cNvPr id="3" name="Content Placeholder 2"/>
-          <p:cNvSpPr>
-            <a:spLocks noGrp="1"/>
-          </p:cNvSpPr>
-          <p:nvPr>
-            <p:ph idx="1"/>
-          </p:nvPr>
-        </p:nvSpPr>
-        <p:spPr/>
-        <p:txBody>
-          <a:bodyPr>
-            <a:normAutofit/>
-          </a:bodyPr>
-          <a:lstStyle/>
-          <a:p>
-            <a:r>
-              <a:rPr lang="en-US" dirty="0"/>
-              <a:t>OSCOM simulator and testing platform. Virtually implementing new utilities/techniques within OSCOM such as OpenCV applications (automatic tracking software) or new equipment (simulate filters, telescope optics, cameras, etc.). </a:t>
-            </a:r>
-          </a:p>
-          <a:p>
-            <a:r>
-              <a:rPr lang="en-US" dirty="0"/>
-              <a:t>Research aid. Provides a more intuitive understanding of how spacecraft configurations (orbit, attitude, rotation, etc.) </a:t>
-            </a:r>
-            <a:r>
-              <a:rPr lang="en-US" dirty="0" err="1"/>
-              <a:t>corellate</a:t>
-            </a:r>
-            <a:r>
-              <a:rPr lang="en-US" dirty="0"/>
-              <a:t> to light curve data and provide a means of interacting with the scenario to quickly and easily test/explore new ideas. </a:t>
-            </a:r>
-          </a:p>
-          <a:p>
-            <a:r>
-              <a:rPr lang="en-US" dirty="0"/>
-              <a:t>CubeSat development. Test CubeSat models and configurations within the software in order to optimize their design for use with OSCOM. </a:t>
-            </a:r>
-          </a:p>
-        </p:txBody>
-      </p:sp>
-      <p:pic>
-        <p:nvPicPr>
-          <p:cNvPr id="4" name="Picture 3"/>
-          <p:cNvPicPr>
-            <a:picLocks noChangeAspect="1"/>
-          </p:cNvPicPr>
-          <p:nvPr/>
-        </p:nvPicPr>
-        <p:blipFill>
-          <a:blip r:embed="rId2">
-            <a:extLst>
-              <a:ext uri="{28A0092B-C50C-407E-A947-70E740481C1C}">
-                <a14:useLocalDpi xmlns:a14="http://schemas.microsoft.com/office/drawing/2010/main" val="0"/>
-              </a:ext>
-            </a:extLst>
-          </a:blip>
-          <a:stretch>
-            <a:fillRect/>
-          </a:stretch>
-        </p:blipFill>
-        <p:spPr>
-          <a:xfrm>
-            <a:off x="10501312" y="0"/>
-            <a:ext cx="1690688" cy="1690688"/>
-          </a:xfrm>
-          <a:prstGeom prst="rect">
-            <a:avLst/>
-          </a:prstGeom>
-        </p:spPr>
-      </p:pic>
-      <p:pic>
-        <p:nvPicPr>
-          <p:cNvPr id="5" name="Picture 4"/>
-          <p:cNvPicPr>
-            <a:picLocks noChangeAspect="1"/>
-          </p:cNvPicPr>
-          <p:nvPr/>
-        </p:nvPicPr>
-        <p:blipFill>
-          <a:blip r:embed="rId3">
-            <a:extLst>
-              <a:ext uri="{28A0092B-C50C-407E-A947-70E740481C1C}">
-                <a14:useLocalDpi xmlns:a14="http://schemas.microsoft.com/office/drawing/2010/main" val="0"/>
-              </a:ext>
-            </a:extLst>
-          </a:blip>
-          <a:stretch>
-            <a:fillRect/>
-          </a:stretch>
-        </p:blipFill>
-        <p:spPr>
-          <a:xfrm>
-            <a:off x="10416742" y="5822874"/>
-            <a:ext cx="1775258" cy="1035126"/>
-          </a:xfrm>
-          <a:prstGeom prst="rect">
-            <a:avLst/>
-          </a:prstGeom>
-        </p:spPr>
-      </p:pic>
-    </p:spTree>
-    <p:extLst>
-      <p:ext uri="{BB962C8B-B14F-4D97-AF65-F5344CB8AC3E}">
-        <p14:creationId xmlns:p14="http://schemas.microsoft.com/office/powerpoint/2010/main" val="2537404502"/>
-      </p:ext>
-    </p:extLst>
-  </p:cSld>
-  <p:clrMapOvr>
-    <a:masterClrMapping/>
-  </p:clrMapOvr>
-</p:sld>
-</file>
-
-<file path=ppt/slides/slide5.xml><?xml version="1.0" encoding="utf-8"?>
-<p:sld xmlns:a="http://schemas.openxmlformats.org/drawingml/2006/main" xmlns:r="http://schemas.openxmlformats.org/officeDocument/2006/relationships" xmlns:p="http://schemas.openxmlformats.org/presentationml/2006/main">
-  <p:cSld>
-    <p:spTree>
-      <p:nvGrpSpPr>
-        <p:cNvPr id="1" name=""/>
-        <p:cNvGrpSpPr/>
-        <p:nvPr/>
-      </p:nvGrpSpPr>
-      <p:grpSpPr>
-        <a:xfrm>
-          <a:off x="0" y="0"/>
-          <a:ext cx="0" cy="0"/>
-          <a:chOff x="0" y="0"/>
-          <a:chExt cx="0" cy="0"/>
-        </a:xfrm>
-      </p:grpSpPr>
-      <p:sp>
-        <p:nvSpPr>
-          <p:cNvPr id="2" name="Title 1"/>
-          <p:cNvSpPr>
-            <a:spLocks noGrp="1"/>
-          </p:cNvSpPr>
-          <p:nvPr>
-            <p:ph type="title"/>
-          </p:nvPr>
-        </p:nvSpPr>
-        <p:spPr/>
-        <p:txBody>
-          <a:bodyPr/>
-          <a:lstStyle/>
-          <a:p>
-            <a:r>
-              <a:rPr lang="en-US" dirty="0"/>
-              <a:t>Solution Discussion</a:t>
-            </a:r>
-          </a:p>
-        </p:txBody>
-      </p:sp>
-      <p:sp>
-        <p:nvSpPr>
-          <p:cNvPr id="3" name="Content Placeholder 2"/>
-          <p:cNvSpPr>
-            <a:spLocks noGrp="1"/>
-          </p:cNvSpPr>
-          <p:nvPr>
-            <p:ph idx="1"/>
-          </p:nvPr>
-        </p:nvSpPr>
-        <p:spPr>
-          <a:xfrm>
-            <a:off x="838200" y="1690688"/>
-            <a:ext cx="10515600" cy="5005676"/>
-          </a:xfrm>
-        </p:spPr>
-        <p:txBody>
-          <a:bodyPr>
-            <a:normAutofit fontScale="92500" lnSpcReduction="10000"/>
-          </a:bodyPr>
-          <a:lstStyle/>
-          <a:p>
-            <a:r>
-              <a:rPr lang="en-US" dirty="0"/>
-              <a:t>Rendering the RSO:</a:t>
-            </a:r>
-          </a:p>
-          <a:p>
-            <a:pPr lvl="1"/>
-            <a:r>
-              <a:rPr lang="en-US" sz="2000" dirty="0"/>
-              <a:t>Rendering methods: Ray Tracing VS Rasterization</a:t>
-            </a:r>
-          </a:p>
-          <a:p>
-            <a:pPr lvl="2"/>
-            <a:r>
-              <a:rPr lang="en-US" dirty="0"/>
-              <a:t>Monte Carlo Ray Tracing algorithms: Trace light rays throughout a scene and simulate their interactions with the surfaces that they encounter. Visually: Extremely Realistic. Computationally: Extremely Expensive. Not Practical for the purposes of this program.</a:t>
-            </a:r>
-          </a:p>
-          <a:p>
-            <a:pPr lvl="2"/>
-            <a:r>
-              <a:rPr lang="en-US" dirty="0"/>
-              <a:t>Rasterization and Scanline Rendering: Converting vertex data from virtual models to pixel data. Renders the scene “line by line” producing rows of pixels at a time. Visually: Realistic when implemented with accurate shading algorithms. Computationally: Extremely cheap compared to Ray tracing.</a:t>
-            </a:r>
-          </a:p>
-          <a:p>
-            <a:pPr lvl="2"/>
-            <a:r>
-              <a:rPr lang="en-US" dirty="0"/>
-              <a:t>Although rasterization is not quite as accurate as ray tracing algorithms, the visual differences between these methods should have little effect on the apparent brightness of the RSO. (Still needs to be 100% confirmed. What is the resolution of the observational photometry data?)</a:t>
-            </a:r>
-          </a:p>
-          <a:p>
-            <a:pPr marL="684213" lvl="2" indent="-222250"/>
-            <a:r>
-              <a:rPr lang="en-US" dirty="0"/>
-              <a:t>Phong Shading Algorithm: Interpolation algorithm based on the Phong reflection model to produce accurate renderings of virtual objects. Ignore ambient lighting component b/c no atmosphere.</a:t>
-            </a:r>
-          </a:p>
-          <a:p>
-            <a:pPr marL="684213" lvl="2" indent="-222250"/>
-            <a:r>
-              <a:rPr lang="en-US" dirty="0"/>
-              <a:t>Use sphere mapping to accurately model reflections on metallic surfaces</a:t>
-            </a:r>
-          </a:p>
-          <a:p>
-            <a:pPr marL="684213" lvl="2" indent="-222250"/>
-            <a:r>
-              <a:rPr lang="en-US" dirty="0"/>
-              <a:t>Implement shadow mapping algorithms to generate accurate shadows.</a:t>
-            </a:r>
-          </a:p>
-          <a:p>
-            <a:pPr marL="684213" lvl="2" indent="-222250"/>
-            <a:r>
-              <a:rPr lang="en-US" dirty="0"/>
-              <a:t>Use accurate BRDF data to simulate material properties</a:t>
-            </a:r>
-          </a:p>
-          <a:p>
-            <a:pPr marL="684213" lvl="2" indent="-222250"/>
-            <a:endParaRPr lang="en-US" dirty="0"/>
-          </a:p>
-        </p:txBody>
-      </p:sp>
-      <p:pic>
-        <p:nvPicPr>
-          <p:cNvPr id="4" name="Picture 3"/>
-          <p:cNvPicPr>
-            <a:picLocks noChangeAspect="1"/>
-          </p:cNvPicPr>
-          <p:nvPr/>
-        </p:nvPicPr>
-        <p:blipFill>
-          <a:blip r:embed="rId2">
-            <a:extLst>
-              <a:ext uri="{28A0092B-C50C-407E-A947-70E740481C1C}">
-                <a14:useLocalDpi xmlns:a14="http://schemas.microsoft.com/office/drawing/2010/main" val="0"/>
-              </a:ext>
-            </a:extLst>
-          </a:blip>
-          <a:stretch>
-            <a:fillRect/>
-          </a:stretch>
-        </p:blipFill>
-        <p:spPr>
-          <a:xfrm>
-            <a:off x="10416742" y="5822874"/>
-            <a:ext cx="1775258" cy="1035126"/>
-          </a:xfrm>
-          <a:prstGeom prst="rect">
-            <a:avLst/>
-          </a:prstGeom>
-        </p:spPr>
-      </p:pic>
-      <p:pic>
-        <p:nvPicPr>
-          <p:cNvPr id="5" name="Picture 4"/>
-          <p:cNvPicPr>
-            <a:picLocks noChangeAspect="1"/>
-          </p:cNvPicPr>
-          <p:nvPr/>
-        </p:nvPicPr>
-        <p:blipFill>
-          <a:blip r:embed="rId3">
-            <a:extLst>
-              <a:ext uri="{28A0092B-C50C-407E-A947-70E740481C1C}">
-                <a14:useLocalDpi xmlns:a14="http://schemas.microsoft.com/office/drawing/2010/main" val="0"/>
-              </a:ext>
-            </a:extLst>
-          </a:blip>
-          <a:stretch>
-            <a:fillRect/>
-          </a:stretch>
-        </p:blipFill>
-        <p:spPr>
-          <a:xfrm>
-            <a:off x="10501312" y="0"/>
-            <a:ext cx="1690688" cy="1690688"/>
-          </a:xfrm>
-          <a:prstGeom prst="rect">
-            <a:avLst/>
-          </a:prstGeom>
-        </p:spPr>
-      </p:pic>
-    </p:spTree>
-    <p:extLst>
-      <p:ext uri="{BB962C8B-B14F-4D97-AF65-F5344CB8AC3E}">
-        <p14:creationId xmlns:p14="http://schemas.microsoft.com/office/powerpoint/2010/main" val="2691955007"/>
-      </p:ext>
-    </p:extLst>
-  </p:cSld>
-  <p:clrMapOvr>
-    <a:masterClrMapping/>
-  </p:clrMapOvr>
-</p:sld>
-</file>
-
-<file path=ppt/slides/slide6.xml><?xml version="1.0" encoding="utf-8"?>
-<p:sld xmlns:a="http://schemas.openxmlformats.org/drawingml/2006/main" xmlns:r="http://schemas.openxmlformats.org/officeDocument/2006/relationships" xmlns:p="http://schemas.openxmlformats.org/presentationml/2006/main">
-  <p:cSld>
-    <p:spTree>
-      <p:nvGrpSpPr>
-        <p:cNvPr id="1" name=""/>
-        <p:cNvGrpSpPr/>
-        <p:nvPr/>
-      </p:nvGrpSpPr>
-      <p:grpSpPr>
-        <a:xfrm>
-          <a:off x="0" y="0"/>
-          <a:ext cx="0" cy="0"/>
-          <a:chOff x="0" y="0"/>
-          <a:chExt cx="0" cy="0"/>
-        </a:xfrm>
-      </p:grpSpPr>
-      <p:sp>
-        <p:nvSpPr>
-          <p:cNvPr id="2" name="Title 1"/>
-          <p:cNvSpPr>
-            <a:spLocks noGrp="1"/>
-          </p:cNvSpPr>
-          <p:nvPr>
-            <p:ph type="title"/>
-          </p:nvPr>
-        </p:nvSpPr>
-        <p:spPr/>
-        <p:txBody>
-          <a:bodyPr/>
-          <a:lstStyle/>
-          <a:p>
-            <a:r>
-              <a:rPr lang="en-US" dirty="0"/>
-              <a:t>Solution Discussion</a:t>
-            </a:r>
-          </a:p>
-        </p:txBody>
-      </p:sp>
-      <p:sp>
-        <p:nvSpPr>
-          <p:cNvPr id="3" name="Content Placeholder 2"/>
-          <p:cNvSpPr>
-            <a:spLocks noGrp="1"/>
-          </p:cNvSpPr>
-          <p:nvPr>
-            <p:ph idx="1"/>
-          </p:nvPr>
-        </p:nvSpPr>
-        <p:spPr/>
-        <p:txBody>
-          <a:bodyPr>
-            <a:normAutofit/>
-          </a:bodyPr>
-          <a:lstStyle/>
-          <a:p>
-            <a:r>
-              <a:rPr lang="en-US" dirty="0"/>
-              <a:t>Modelling the RSO:</a:t>
-            </a:r>
-          </a:p>
-          <a:p>
-            <a:pPr lvl="1"/>
-            <a:r>
-              <a:rPr lang="en-US" dirty="0"/>
-              <a:t>Import CAD models to COMPASS directly using common vertex-based model formats. (STL, OBJ, and AMF)</a:t>
-            </a:r>
-          </a:p>
-          <a:p>
-            <a:pPr lvl="1"/>
-            <a:r>
-              <a:rPr lang="en-US" dirty="0"/>
-              <a:t>Use Blender to import CAD models and apply colors/textures/material properties/Surface normal/etc. Export blender models into COMPASS</a:t>
-            </a:r>
-          </a:p>
-          <a:p>
-            <a:pPr lvl="1"/>
-            <a:r>
-              <a:rPr lang="en-US" dirty="0"/>
-              <a:t>Use CAD models from SAIL CubeSats or Spacecraft Development Club’s RADSat.</a:t>
-            </a:r>
-          </a:p>
-          <a:p>
-            <a:pPr lvl="1"/>
-            <a:r>
-              <a:rPr lang="en-US" dirty="0"/>
-              <a:t>NASA has various satellite models publicly available. Use for testing.</a:t>
-            </a:r>
-          </a:p>
-          <a:p>
-            <a:pPr marL="0" indent="0">
-              <a:buNone/>
-            </a:pPr>
-            <a:endParaRPr lang="en-US" dirty="0"/>
-          </a:p>
-        </p:txBody>
-      </p:sp>
-      <p:pic>
-        <p:nvPicPr>
-          <p:cNvPr id="4" name="Picture 3"/>
-          <p:cNvPicPr>
-            <a:picLocks noChangeAspect="1"/>
-          </p:cNvPicPr>
-          <p:nvPr/>
-        </p:nvPicPr>
-        <p:blipFill>
-          <a:blip r:embed="rId2">
-            <a:extLst>
-              <a:ext uri="{28A0092B-C50C-407E-A947-70E740481C1C}">
-                <a14:useLocalDpi xmlns:a14="http://schemas.microsoft.com/office/drawing/2010/main" val="0"/>
-              </a:ext>
-            </a:extLst>
-          </a:blip>
-          <a:stretch>
-            <a:fillRect/>
-          </a:stretch>
-        </p:blipFill>
-        <p:spPr>
-          <a:xfrm>
-            <a:off x="10416742" y="5822874"/>
-            <a:ext cx="1775258" cy="1035126"/>
-          </a:xfrm>
-          <a:prstGeom prst="rect">
-            <a:avLst/>
-          </a:prstGeom>
-        </p:spPr>
-      </p:pic>
-      <p:pic>
-        <p:nvPicPr>
-          <p:cNvPr id="5" name="Picture 4"/>
-          <p:cNvPicPr>
-            <a:picLocks noChangeAspect="1"/>
-          </p:cNvPicPr>
-          <p:nvPr/>
-        </p:nvPicPr>
-        <p:blipFill>
-          <a:blip r:embed="rId3">
-            <a:extLst>
-              <a:ext uri="{28A0092B-C50C-407E-A947-70E740481C1C}">
-                <a14:useLocalDpi xmlns:a14="http://schemas.microsoft.com/office/drawing/2010/main" val="0"/>
-              </a:ext>
-            </a:extLst>
-          </a:blip>
-          <a:stretch>
-            <a:fillRect/>
-          </a:stretch>
-        </p:blipFill>
-        <p:spPr>
-          <a:xfrm>
-            <a:off x="10501312" y="0"/>
-            <a:ext cx="1690688" cy="1690688"/>
-          </a:xfrm>
-          <a:prstGeom prst="rect">
-            <a:avLst/>
-          </a:prstGeom>
-        </p:spPr>
-      </p:pic>
-    </p:spTree>
-    <p:extLst>
-      <p:ext uri="{BB962C8B-B14F-4D97-AF65-F5344CB8AC3E}">
-        <p14:creationId xmlns:p14="http://schemas.microsoft.com/office/powerpoint/2010/main" val="1692999073"/>
-      </p:ext>
-    </p:extLst>
-  </p:cSld>
-  <p:clrMapOvr>
-    <a:masterClrMapping/>
-  </p:clrMapOvr>
-</p:sld>
-</file>
-
-<file path=ppt/slides/slide7.xml><?xml version="1.0" encoding="utf-8"?>
-<p:sld xmlns:a="http://schemas.openxmlformats.org/drawingml/2006/main" xmlns:r="http://schemas.openxmlformats.org/officeDocument/2006/relationships" xmlns:p="http://schemas.openxmlformats.org/presentationml/2006/main">
-  <p:cSld>
-    <p:spTree>
-      <p:nvGrpSpPr>
-        <p:cNvPr id="1" name=""/>
-        <p:cNvGrpSpPr/>
-        <p:nvPr/>
-      </p:nvGrpSpPr>
-      <p:grpSpPr>
-        <a:xfrm>
-          <a:off x="0" y="0"/>
-          <a:ext cx="0" cy="0"/>
-          <a:chOff x="0" y="0"/>
-          <a:chExt cx="0" cy="0"/>
-        </a:xfrm>
-      </p:grpSpPr>
-      <p:sp>
-        <p:nvSpPr>
-          <p:cNvPr id="2" name="Title 1"/>
-          <p:cNvSpPr>
-            <a:spLocks noGrp="1"/>
-          </p:cNvSpPr>
-          <p:nvPr>
-            <p:ph type="title"/>
-          </p:nvPr>
-        </p:nvSpPr>
-        <p:spPr/>
-        <p:txBody>
-          <a:bodyPr/>
-          <a:lstStyle/>
-          <a:p>
-            <a:r>
-              <a:rPr lang="en-US" dirty="0"/>
-              <a:t>Solution Discussion</a:t>
-            </a:r>
-          </a:p>
-        </p:txBody>
-      </p:sp>
-      <p:sp>
-        <p:nvSpPr>
-          <p:cNvPr id="3" name="Content Placeholder 2"/>
-          <p:cNvSpPr>
-            <a:spLocks noGrp="1"/>
-          </p:cNvSpPr>
-          <p:nvPr>
-            <p:ph idx="1"/>
-          </p:nvPr>
-        </p:nvSpPr>
-        <p:spPr/>
-        <p:txBody>
-          <a:bodyPr>
-            <a:normAutofit fontScale="92500" lnSpcReduction="20000"/>
-          </a:bodyPr>
-          <a:lstStyle/>
-          <a:p>
-            <a:r>
-              <a:rPr lang="en-US" dirty="0"/>
-              <a:t>Rendering the Environment:</a:t>
-            </a:r>
-          </a:p>
-          <a:p>
-            <a:pPr lvl="1"/>
-            <a:r>
-              <a:rPr lang="en-US" dirty="0"/>
-              <a:t>RSO Position modelling: Use SGP4 orbit propagator library to accurately model the position/location of the RSO</a:t>
-            </a:r>
-          </a:p>
-          <a:p>
-            <a:pPr lvl="1"/>
-            <a:r>
-              <a:rPr lang="en-US" dirty="0"/>
-              <a:t>Render the RSO from the perspective of the telescope, but much closer (almost like you could zoom in a ton with the telescope to produce a resolved image). This way, the change in brightness as seen by the telescope can be calculated more precisely.</a:t>
-            </a:r>
-          </a:p>
-          <a:p>
-            <a:pPr lvl="1"/>
-            <a:r>
-              <a:rPr lang="en-US" dirty="0"/>
-              <a:t>Model the Sun, Moon, and Earth in their proper locations relative to the RSO (Probably using info from SGP4 or something similar). Create light sources at the location of each of these bodies that shine on the RSO(figure out proper intensities for these. Earth should definitely be considered. Moon is not as significant. Start with sun and go from there).</a:t>
-            </a:r>
-          </a:p>
-          <a:p>
-            <a:pPr lvl="1"/>
-            <a:r>
-              <a:rPr lang="en-US" dirty="0"/>
-              <a:t>Render starfield</a:t>
-            </a:r>
-          </a:p>
-          <a:p>
-            <a:pPr lvl="1"/>
-            <a:r>
-              <a:rPr lang="en-US" dirty="0"/>
-              <a:t>Rendering the environment should only be used for sphere mapping and User-End visualization. When rendering the pass used to calculate brightness, we don’t want to include the background in this calculation, just the RSO. </a:t>
-            </a:r>
-          </a:p>
-          <a:p>
-            <a:pPr lvl="1"/>
-            <a:endParaRPr lang="en-US" dirty="0"/>
-          </a:p>
-          <a:p>
-            <a:pPr lvl="1"/>
-            <a:endParaRPr lang="en-US" dirty="0"/>
-          </a:p>
-        </p:txBody>
-      </p:sp>
-      <p:pic>
-        <p:nvPicPr>
-          <p:cNvPr id="4" name="Picture 3"/>
-          <p:cNvPicPr>
-            <a:picLocks noChangeAspect="1"/>
-          </p:cNvPicPr>
-          <p:nvPr/>
-        </p:nvPicPr>
-        <p:blipFill>
-          <a:blip r:embed="rId2">
-            <a:extLst>
-              <a:ext uri="{28A0092B-C50C-407E-A947-70E740481C1C}">
-                <a14:useLocalDpi xmlns:a14="http://schemas.microsoft.com/office/drawing/2010/main" val="0"/>
-              </a:ext>
-            </a:extLst>
-          </a:blip>
-          <a:stretch>
-            <a:fillRect/>
-          </a:stretch>
-        </p:blipFill>
-        <p:spPr>
-          <a:xfrm>
-            <a:off x="10416742" y="5822874"/>
-            <a:ext cx="1775258" cy="1035126"/>
-          </a:xfrm>
-          <a:prstGeom prst="rect">
-            <a:avLst/>
-          </a:prstGeom>
-        </p:spPr>
-      </p:pic>
-      <p:pic>
-        <p:nvPicPr>
-          <p:cNvPr id="5" name="Picture 4"/>
-          <p:cNvPicPr>
-            <a:picLocks noChangeAspect="1"/>
-          </p:cNvPicPr>
-          <p:nvPr/>
-        </p:nvPicPr>
-        <p:blipFill>
-          <a:blip r:embed="rId3">
-            <a:extLst>
-              <a:ext uri="{28A0092B-C50C-407E-A947-70E740481C1C}">
-                <a14:useLocalDpi xmlns:a14="http://schemas.microsoft.com/office/drawing/2010/main" val="0"/>
-              </a:ext>
-            </a:extLst>
-          </a:blip>
-          <a:stretch>
-            <a:fillRect/>
-          </a:stretch>
-        </p:blipFill>
-        <p:spPr>
-          <a:xfrm>
-            <a:off x="10501312" y="0"/>
-            <a:ext cx="1690688" cy="1690688"/>
-          </a:xfrm>
-          <a:prstGeom prst="rect">
-            <a:avLst/>
-          </a:prstGeom>
-        </p:spPr>
-      </p:pic>
-    </p:spTree>
-    <p:extLst>
-      <p:ext uri="{BB962C8B-B14F-4D97-AF65-F5344CB8AC3E}">
-        <p14:creationId xmlns:p14="http://schemas.microsoft.com/office/powerpoint/2010/main" val="2724523176"/>
-      </p:ext>
-    </p:extLst>
-  </p:cSld>
-  <p:clrMapOvr>
-    <a:masterClrMapping/>
-  </p:clrMapOvr>
-</p:sld>
-</file>
-
-<file path=ppt/slides/slide8.xml><?xml version="1.0" encoding="utf-8"?>
-<p:sld xmlns:a="http://schemas.openxmlformats.org/drawingml/2006/main" xmlns:r="http://schemas.openxmlformats.org/officeDocument/2006/relationships" xmlns:p="http://schemas.openxmlformats.org/presentationml/2006/main">
-  <p:cSld>
-    <p:spTree>
-      <p:nvGrpSpPr>
-        <p:cNvPr id="1" name=""/>
-        <p:cNvGrpSpPr/>
-        <p:nvPr/>
-      </p:nvGrpSpPr>
-      <p:grpSpPr>
-        <a:xfrm>
-          <a:off x="0" y="0"/>
-          <a:ext cx="0" cy="0"/>
-          <a:chOff x="0" y="0"/>
-          <a:chExt cx="0" cy="0"/>
-        </a:xfrm>
-      </p:grpSpPr>
-      <p:sp>
-        <p:nvSpPr>
-          <p:cNvPr id="2" name="Title 1"/>
-          <p:cNvSpPr>
-            <a:spLocks noGrp="1"/>
-          </p:cNvSpPr>
-          <p:nvPr>
-            <p:ph type="title"/>
-          </p:nvPr>
-        </p:nvSpPr>
-        <p:spPr/>
-        <p:txBody>
-          <a:bodyPr/>
-          <a:lstStyle/>
-          <a:p>
-            <a:r>
-              <a:rPr lang="en-US" dirty="0"/>
-              <a:t>Solution Discussion</a:t>
-            </a:r>
-          </a:p>
-        </p:txBody>
-      </p:sp>
-      <p:sp>
-        <p:nvSpPr>
-          <p:cNvPr id="3" name="Content Placeholder 2"/>
-          <p:cNvSpPr>
-            <a:spLocks noGrp="1"/>
-          </p:cNvSpPr>
-          <p:nvPr>
-            <p:ph idx="1"/>
-          </p:nvPr>
-        </p:nvSpPr>
-        <p:spPr/>
-        <p:txBody>
-          <a:bodyPr>
-            <a:normAutofit fontScale="92500"/>
-          </a:bodyPr>
-          <a:lstStyle/>
-          <a:p>
-            <a:r>
-              <a:rPr lang="en-US" dirty="0"/>
-              <a:t>Generating Photometry Curves:</a:t>
-            </a:r>
-          </a:p>
-          <a:p>
-            <a:pPr lvl="1"/>
-            <a:r>
-              <a:rPr lang="en-US" dirty="0"/>
-              <a:t>Use the “up-close” RSO rendering to accurately determine the RSO’s brightness throughout the pass (I have ideas on how to do this accurately, but I’m still not 100% sure… I’ll have to think about it more and do some research). </a:t>
-            </a:r>
-          </a:p>
-          <a:p>
-            <a:pPr lvl="1"/>
-            <a:r>
-              <a:rPr lang="en-US" dirty="0"/>
-              <a:t>Produce a rendering pass from the perspective of the telescope as it would appear in actual observations. (i.e. not zoomed in anymore). The satellite now appears as a couple of pixels, but its brightness fluctuates according to the calculations made during the “up-close” rendering pass in addition to the brightness fluctuations associated with the observing system. Allows for greater precision than just rendering it from really far away in the first place.</a:t>
-            </a:r>
-          </a:p>
-          <a:p>
-            <a:pPr lvl="1"/>
-            <a:r>
-              <a:rPr lang="en-US" dirty="0"/>
-              <a:t>Simulate environmental effects on the brightness of the object (atmospheric </a:t>
-            </a:r>
-            <a:r>
-              <a:rPr lang="en-US"/>
-              <a:t>distortion, etc</a:t>
-            </a:r>
-            <a:r>
-              <a:rPr lang="en-US" dirty="0"/>
-              <a:t>.)</a:t>
-            </a:r>
-          </a:p>
-          <a:p>
-            <a:pPr lvl="1"/>
-            <a:r>
-              <a:rPr lang="en-US" dirty="0"/>
-              <a:t>Simulate the detector itself (data binning, camera noise, etc.)</a:t>
-            </a:r>
-          </a:p>
-          <a:p>
-            <a:pPr marL="914400" lvl="2" indent="0">
-              <a:buNone/>
-            </a:pPr>
-            <a:endParaRPr lang="en-US" dirty="0"/>
-          </a:p>
-          <a:p>
-            <a:endParaRPr lang="en-US" dirty="0"/>
-          </a:p>
-        </p:txBody>
-      </p:sp>
-      <p:pic>
-        <p:nvPicPr>
-          <p:cNvPr id="4" name="Picture 3"/>
-          <p:cNvPicPr>
-            <a:picLocks noChangeAspect="1"/>
-          </p:cNvPicPr>
-          <p:nvPr/>
-        </p:nvPicPr>
-        <p:blipFill>
-          <a:blip r:embed="rId2">
-            <a:extLst>
-              <a:ext uri="{28A0092B-C50C-407E-A947-70E740481C1C}">
-                <a14:useLocalDpi xmlns:a14="http://schemas.microsoft.com/office/drawing/2010/main" val="0"/>
-              </a:ext>
-            </a:extLst>
-          </a:blip>
-          <a:stretch>
-            <a:fillRect/>
-          </a:stretch>
-        </p:blipFill>
-        <p:spPr>
-          <a:xfrm>
-            <a:off x="10416742" y="5822874"/>
-            <a:ext cx="1775258" cy="1035126"/>
-          </a:xfrm>
-          <a:prstGeom prst="rect">
-            <a:avLst/>
-          </a:prstGeom>
-        </p:spPr>
-      </p:pic>
-      <p:pic>
-        <p:nvPicPr>
-          <p:cNvPr id="5" name="Picture 4"/>
-          <p:cNvPicPr>
-            <a:picLocks noChangeAspect="1"/>
-          </p:cNvPicPr>
-          <p:nvPr/>
-        </p:nvPicPr>
-        <p:blipFill>
-          <a:blip r:embed="rId3">
-            <a:extLst>
-              <a:ext uri="{28A0092B-C50C-407E-A947-70E740481C1C}">
-                <a14:useLocalDpi xmlns:a14="http://schemas.microsoft.com/office/drawing/2010/main" val="0"/>
-              </a:ext>
-            </a:extLst>
-          </a:blip>
-          <a:stretch>
-            <a:fillRect/>
-          </a:stretch>
-        </p:blipFill>
-        <p:spPr>
-          <a:xfrm>
-            <a:off x="10501312" y="0"/>
-            <a:ext cx="1690688" cy="1690688"/>
-          </a:xfrm>
-          <a:prstGeom prst="rect">
-            <a:avLst/>
-          </a:prstGeom>
-        </p:spPr>
-      </p:pic>
-    </p:spTree>
-    <p:extLst>
-      <p:ext uri="{BB962C8B-B14F-4D97-AF65-F5344CB8AC3E}">
-        <p14:creationId xmlns:p14="http://schemas.microsoft.com/office/powerpoint/2010/main" val="2487836940"/>
-      </p:ext>
-    </p:extLst>
-  </p:cSld>
-  <p:clrMapOvr>
-    <a:masterClrMapping/>
-  </p:clrMapOvr>
-</p:sld>
-</file>
-
-<file path=ppt/slides/slide9.xml><?xml version="1.0" encoding="utf-8"?>
-<p:sld xmlns:a="http://schemas.openxmlformats.org/drawingml/2006/main" xmlns:r="http://schemas.openxmlformats.org/officeDocument/2006/relationships" xmlns:p="http://schemas.openxmlformats.org/presentationml/2006/main">
-  <p:cSld>
-    <p:spTree>
-      <p:nvGrpSpPr>
-        <p:cNvPr id="1" name=""/>
-        <p:cNvGrpSpPr/>
-        <p:nvPr/>
-      </p:nvGrpSpPr>
-      <p:grpSpPr>
-        <a:xfrm>
-          <a:off x="0" y="0"/>
-          <a:ext cx="0" cy="0"/>
-          <a:chOff x="0" y="0"/>
-          <a:chExt cx="0" cy="0"/>
-        </a:xfrm>
-      </p:grpSpPr>
-      <p:sp>
-        <p:nvSpPr>
-          <p:cNvPr id="2" name="Title 1"/>
-          <p:cNvSpPr>
-            <a:spLocks noGrp="1"/>
-          </p:cNvSpPr>
-          <p:nvPr>
-            <p:ph type="title"/>
-          </p:nvPr>
-        </p:nvSpPr>
-        <p:spPr/>
-        <p:txBody>
-          <a:bodyPr/>
-          <a:lstStyle/>
-          <a:p>
-            <a:r>
-              <a:rPr lang="en-US" dirty="0"/>
-              <a:t>Solution Discussion</a:t>
-            </a:r>
-          </a:p>
-        </p:txBody>
-      </p:sp>
-      <p:sp>
-        <p:nvSpPr>
-          <p:cNvPr id="3" name="Content Placeholder 2"/>
-          <p:cNvSpPr>
-            <a:spLocks noGrp="1"/>
-          </p:cNvSpPr>
-          <p:nvPr>
-            <p:ph idx="1"/>
-          </p:nvPr>
-        </p:nvSpPr>
-        <p:spPr/>
-        <p:txBody>
-          <a:bodyPr>
-            <a:normAutofit/>
-          </a:bodyPr>
-          <a:lstStyle/>
-          <a:p>
-            <a:r>
-              <a:rPr lang="en-US" dirty="0"/>
-              <a:t>Reconstructing RSO Attitude/Rotation:</a:t>
-            </a:r>
-          </a:p>
-          <a:p>
-            <a:pPr lvl="1"/>
-            <a:r>
-              <a:rPr lang="en-US" dirty="0"/>
-              <a:t>Still need to look into it more, but I have some ideas.</a:t>
-            </a:r>
-          </a:p>
-          <a:p>
-            <a:pPr lvl="1"/>
-            <a:r>
-              <a:rPr lang="en-US" dirty="0"/>
-              <a:t>According to Euler’s rotation theorem, any displacement of any body in which a point remains fixed in space can be reduced to a single rotation about a single axis. If the program is able to discern a periodicity within the photometry data, it can set the RSO’s rotational period to this value. It can then try a number of configurations/rotations and line up the peaks of the generated light curve with those of the observed light curve. It will run numerous simulations and attempt to narrow in on the configuration that produces the closest fit to the actual data. </a:t>
-            </a:r>
-          </a:p>
-        </p:txBody>
-      </p:sp>
-      <p:pic>
-        <p:nvPicPr>
-          <p:cNvPr id="4" name="Picture 3"/>
-          <p:cNvPicPr>
-            <a:picLocks noChangeAspect="1"/>
-          </p:cNvPicPr>
-          <p:nvPr/>
-        </p:nvPicPr>
-        <p:blipFill>
-          <a:blip r:embed="rId2">
-            <a:extLst>
-              <a:ext uri="{28A0092B-C50C-407E-A947-70E740481C1C}">
-                <a14:useLocalDpi xmlns:a14="http://schemas.microsoft.com/office/drawing/2010/main" val="0"/>
-              </a:ext>
-            </a:extLst>
-          </a:blip>
-          <a:stretch>
-            <a:fillRect/>
-          </a:stretch>
-        </p:blipFill>
-        <p:spPr>
-          <a:xfrm>
-            <a:off x="10416742" y="5822874"/>
-            <a:ext cx="1775258" cy="1035126"/>
-          </a:xfrm>
-          <a:prstGeom prst="rect">
-            <a:avLst/>
-          </a:prstGeom>
-        </p:spPr>
-      </p:pic>
-      <p:pic>
-        <p:nvPicPr>
-          <p:cNvPr id="5" name="Picture 4"/>
-          <p:cNvPicPr>
-            <a:picLocks noChangeAspect="1"/>
-          </p:cNvPicPr>
-          <p:nvPr/>
-        </p:nvPicPr>
-        <p:blipFill>
-          <a:blip r:embed="rId3">
-            <a:extLst>
-              <a:ext uri="{28A0092B-C50C-407E-A947-70E740481C1C}">
-                <a14:useLocalDpi xmlns:a14="http://schemas.microsoft.com/office/drawing/2010/main" val="0"/>
-              </a:ext>
-            </a:extLst>
-          </a:blip>
-          <a:stretch>
-            <a:fillRect/>
-          </a:stretch>
-        </p:blipFill>
-        <p:spPr>
-          <a:xfrm>
-            <a:off x="10501312" y="0"/>
-            <a:ext cx="1690688" cy="1690688"/>
-          </a:xfrm>
-          <a:prstGeom prst="rect">
-            <a:avLst/>
-          </a:prstGeom>
-        </p:spPr>
-      </p:pic>
-    </p:spTree>
-    <p:extLst>
-      <p:ext uri="{BB962C8B-B14F-4D97-AF65-F5344CB8AC3E}">
-        <p14:creationId xmlns:p14="http://schemas.microsoft.com/office/powerpoint/2010/main" val="81746140"/>
-      </p:ext>
-    </p:extLst>
-  </p:cSld>
-  <p:clrMapOvr>
-    <a:masterClrMapping/>
-  </p:clrMapOvr>
-</p:sld>
-</file>
-
 <file path=ppt/theme/theme1.xml><?xml version="1.0" encoding="utf-8"?>
 <a:theme xmlns:a="http://schemas.openxmlformats.org/drawingml/2006/main" name="Office Theme">
   <a:themeElements>

</xml_diff>

<commit_message>
Several Documentation changes. Renamed several items in the code. Some code structure modifications.
</commit_message>
<xml_diff>
--- a/documentation/COMPASS Project Overview.pptx
+++ b/documentation/COMPASS Project Overview.pptx
@@ -206,7 +206,7 @@
           <a:p>
             <a:fld id="{D059CC2D-C996-4891-89D6-DDA04078794E}" type="datetimeFigureOut">
               <a:rPr lang="en-US" smtClean="0"/>
-              <a:t>8/11/2017</a:t>
+              <a:t>8/12/2017</a:t>
             </a:fld>
             <a:endParaRPr lang="en-US"/>
           </a:p>
@@ -688,7 +688,7 @@
           <a:p>
             <a:fld id="{C4771BD2-2EDC-4A32-BF37-6474222A526D}" type="datetimeFigureOut">
               <a:rPr lang="en-US" smtClean="0"/>
-              <a:t>8/11/2017</a:t>
+              <a:t>8/12/2017</a:t>
             </a:fld>
             <a:endParaRPr lang="en-US"/>
           </a:p>
@@ -858,7 +858,7 @@
           <a:p>
             <a:fld id="{C4771BD2-2EDC-4A32-BF37-6474222A526D}" type="datetimeFigureOut">
               <a:rPr lang="en-US" smtClean="0"/>
-              <a:t>8/11/2017</a:t>
+              <a:t>8/12/2017</a:t>
             </a:fld>
             <a:endParaRPr lang="en-US"/>
           </a:p>
@@ -1038,7 +1038,7 @@
           <a:p>
             <a:fld id="{C4771BD2-2EDC-4A32-BF37-6474222A526D}" type="datetimeFigureOut">
               <a:rPr lang="en-US" smtClean="0"/>
-              <a:t>8/11/2017</a:t>
+              <a:t>8/12/2017</a:t>
             </a:fld>
             <a:endParaRPr lang="en-US"/>
           </a:p>
@@ -1208,7 +1208,7 @@
           <a:p>
             <a:fld id="{C4771BD2-2EDC-4A32-BF37-6474222A526D}" type="datetimeFigureOut">
               <a:rPr lang="en-US" smtClean="0"/>
-              <a:t>8/11/2017</a:t>
+              <a:t>8/12/2017</a:t>
             </a:fld>
             <a:endParaRPr lang="en-US"/>
           </a:p>
@@ -1454,7 +1454,7 @@
           <a:p>
             <a:fld id="{C4771BD2-2EDC-4A32-BF37-6474222A526D}" type="datetimeFigureOut">
               <a:rPr lang="en-US" smtClean="0"/>
-              <a:t>8/11/2017</a:t>
+              <a:t>8/12/2017</a:t>
             </a:fld>
             <a:endParaRPr lang="en-US"/>
           </a:p>
@@ -1686,7 +1686,7 @@
           <a:p>
             <a:fld id="{C4771BD2-2EDC-4A32-BF37-6474222A526D}" type="datetimeFigureOut">
               <a:rPr lang="en-US" smtClean="0"/>
-              <a:t>8/11/2017</a:t>
+              <a:t>8/12/2017</a:t>
             </a:fld>
             <a:endParaRPr lang="en-US"/>
           </a:p>
@@ -2053,7 +2053,7 @@
           <a:p>
             <a:fld id="{C4771BD2-2EDC-4A32-BF37-6474222A526D}" type="datetimeFigureOut">
               <a:rPr lang="en-US" smtClean="0"/>
-              <a:t>8/11/2017</a:t>
+              <a:t>8/12/2017</a:t>
             </a:fld>
             <a:endParaRPr lang="en-US"/>
           </a:p>
@@ -2171,7 +2171,7 @@
           <a:p>
             <a:fld id="{C4771BD2-2EDC-4A32-BF37-6474222A526D}" type="datetimeFigureOut">
               <a:rPr lang="en-US" smtClean="0"/>
-              <a:t>8/11/2017</a:t>
+              <a:t>8/12/2017</a:t>
             </a:fld>
             <a:endParaRPr lang="en-US"/>
           </a:p>
@@ -2266,7 +2266,7 @@
           <a:p>
             <a:fld id="{C4771BD2-2EDC-4A32-BF37-6474222A526D}" type="datetimeFigureOut">
               <a:rPr lang="en-US" smtClean="0"/>
-              <a:t>8/11/2017</a:t>
+              <a:t>8/12/2017</a:t>
             </a:fld>
             <a:endParaRPr lang="en-US"/>
           </a:p>
@@ -2543,7 +2543,7 @@
           <a:p>
             <a:fld id="{C4771BD2-2EDC-4A32-BF37-6474222A526D}" type="datetimeFigureOut">
               <a:rPr lang="en-US" smtClean="0"/>
-              <a:t>8/11/2017</a:t>
+              <a:t>8/12/2017</a:t>
             </a:fld>
             <a:endParaRPr lang="en-US"/>
           </a:p>
@@ -2800,7 +2800,7 @@
           <a:p>
             <a:fld id="{C4771BD2-2EDC-4A32-BF37-6474222A526D}" type="datetimeFigureOut">
               <a:rPr lang="en-US" smtClean="0"/>
-              <a:t>8/11/2017</a:t>
+              <a:t>8/12/2017</a:t>
             </a:fld>
             <a:endParaRPr lang="en-US"/>
           </a:p>
@@ -3013,7 +3013,7 @@
           <a:p>
             <a:fld id="{C4771BD2-2EDC-4A32-BF37-6474222A526D}" type="datetimeFigureOut">
               <a:rPr lang="en-US" smtClean="0"/>
-              <a:t>8/11/2017</a:t>
+              <a:t>8/12/2017</a:t>
             </a:fld>
             <a:endParaRPr lang="en-US"/>
           </a:p>
@@ -3765,78 +3765,7 @@
           <a:p>
             <a:r>
               <a:rPr lang="en-US" dirty="0"/>
-              <a:t>High-Level Requirements</a:t>
-            </a:r>
-          </a:p>
-        </p:txBody>
-      </p:sp>
-      <p:sp>
-        <p:nvSpPr>
-          <p:cNvPr id="3" name="Content Placeholder 2"/>
-          <p:cNvSpPr>
-            <a:spLocks noGrp="1"/>
-          </p:cNvSpPr>
-          <p:nvPr>
-            <p:ph idx="1"/>
-          </p:nvPr>
-        </p:nvSpPr>
-        <p:spPr/>
-        <p:txBody>
-          <a:bodyPr>
-            <a:normAutofit lnSpcReduction="10000"/>
-          </a:bodyPr>
-          <a:lstStyle/>
-          <a:p>
-            <a:r>
-              <a:rPr lang="en-US" dirty="0"/>
-              <a:t>Primary Requirements:</a:t>
-            </a:r>
-          </a:p>
-          <a:p>
-            <a:pPr marL="971550" lvl="1" indent="-514350">
-              <a:buFont typeface="+mj-lt"/>
-              <a:buAutoNum type="arabicPeriod"/>
-            </a:pPr>
-            <a:r>
-              <a:rPr lang="en-US" dirty="0"/>
-              <a:t>The program shall have the ability to accurately produce high-fidelity renderings of RSOs in low-earth orbit and use these renderings to produce photometry curves from the perspective of an earth-based observer.</a:t>
-            </a:r>
-          </a:p>
-          <a:p>
-            <a:pPr marL="971550" lvl="1" indent="-514350">
-              <a:buFont typeface="+mj-lt"/>
-              <a:buAutoNum type="arabicPeriod"/>
-            </a:pPr>
-            <a:r>
-              <a:rPr lang="en-US" dirty="0"/>
-              <a:t>The program shall have the ability to reconstruct the attitude and angular motion of an RSO given its shape, orbital parameters, and photometry curve.</a:t>
-            </a:r>
-          </a:p>
-          <a:p>
-            <a:pPr marL="971550" lvl="1" indent="-514350">
-              <a:buFont typeface="+mj-lt"/>
-              <a:buAutoNum type="arabicPeriod"/>
-            </a:pPr>
-            <a:r>
-              <a:rPr lang="en-US" dirty="0"/>
-              <a:t>The program shall provide a graphical user interface through which the user may specify simulation parameters, run simulations, and observe/interact with renderings and photometry data.</a:t>
-            </a:r>
-          </a:p>
-          <a:p>
-            <a:pPr marL="342900" lvl="1" indent="-342900"/>
-            <a:r>
-              <a:rPr lang="en-US" dirty="0"/>
-              <a:t>Secondary Requirement:</a:t>
-            </a:r>
-          </a:p>
-          <a:p>
-            <a:pPr marL="914400" lvl="2" indent="-457200">
-              <a:buFont typeface="+mj-lt"/>
-              <a:buAutoNum type="arabicPeriod"/>
-            </a:pPr>
-            <a:r>
-              <a:rPr lang="en-US" sz="2400" dirty="0"/>
-              <a:t>The program shall have the ability to reconstruct the shape and attitude of an RSO given its orbital parameters and photometry curve. </a:t>
+              <a:t>Project Requirements</a:t>
             </a:r>
           </a:p>
         </p:txBody>
@@ -3901,6 +3830,837 @@
           </a:prstGeom>
         </p:spPr>
       </p:pic>
+      <p:graphicFrame>
+        <p:nvGraphicFramePr>
+          <p:cNvPr id="8" name="Table 7">
+            <a:extLst>
+              <a:ext uri="{FF2B5EF4-FFF2-40B4-BE49-F238E27FC236}">
+                <a16:creationId xmlns:a16="http://schemas.microsoft.com/office/drawing/2014/main" id="{43AA864B-FCB0-4BDC-9FF0-7C03C134428F}"/>
+              </a:ext>
+            </a:extLst>
+          </p:cNvPr>
+          <p:cNvGraphicFramePr>
+            <a:graphicFrameLocks noGrp="1"/>
+          </p:cNvGraphicFramePr>
+          <p:nvPr>
+            <p:extLst>
+              <p:ext uri="{D42A27DB-BD31-4B8C-83A1-F6EECF244321}">
+                <p14:modId xmlns:p14="http://schemas.microsoft.com/office/powerpoint/2010/main" val="2273350749"/>
+              </p:ext>
+            </p:extLst>
+          </p:nvPr>
+        </p:nvGraphicFramePr>
+        <p:xfrm>
+          <a:off x="838200" y="1828569"/>
+          <a:ext cx="9578542" cy="3856424"/>
+        </p:xfrm>
+        <a:graphic>
+          <a:graphicData uri="http://schemas.openxmlformats.org/drawingml/2006/table">
+            <a:tbl>
+              <a:tblPr firstRow="1" firstCol="1" bandRow="1">
+                <a:tableStyleId>{EB344D84-9AFB-497E-A393-DC336BA19D2E}</a:tableStyleId>
+              </a:tblPr>
+              <a:tblGrid>
+                <a:gridCol w="549588">
+                  <a:extLst>
+                    <a:ext uri="{9D8B030D-6E8A-4147-A177-3AD203B41FA5}">
+                      <a16:colId xmlns:a16="http://schemas.microsoft.com/office/drawing/2014/main" val="3224544072"/>
+                    </a:ext>
+                  </a:extLst>
+                </a:gridCol>
+                <a:gridCol w="9028954">
+                  <a:extLst>
+                    <a:ext uri="{9D8B030D-6E8A-4147-A177-3AD203B41FA5}">
+                      <a16:colId xmlns:a16="http://schemas.microsoft.com/office/drawing/2014/main" val="4147278323"/>
+                    </a:ext>
+                  </a:extLst>
+                </a:gridCol>
+              </a:tblGrid>
+              <a:tr h="350584">
+                <a:tc>
+                  <a:txBody>
+                    <a:bodyPr/>
+                    <a:lstStyle/>
+                    <a:p>
+                      <a:pPr marL="0" marR="0" algn="r">
+                        <a:lnSpc>
+                          <a:spcPct val="107000"/>
+                        </a:lnSpc>
+                        <a:spcBef>
+                          <a:spcPts val="0"/>
+                        </a:spcBef>
+                        <a:spcAft>
+                          <a:spcPts val="0"/>
+                        </a:spcAft>
+                      </a:pPr>
+                      <a:r>
+                        <a:rPr lang="en-US" sz="1200">
+                          <a:effectLst/>
+                        </a:rPr>
+                        <a:t>No.</a:t>
+                      </a:r>
+                      <a:endParaRPr lang="en-US" sz="1100">
+                        <a:effectLst/>
+                        <a:latin typeface="Calibri" panose="020F0502020204030204" pitchFamily="34" charset="0"/>
+                        <a:ea typeface="Calibri" panose="020F0502020204030204" pitchFamily="34" charset="0"/>
+                        <a:cs typeface="Times New Roman" panose="02020603050405020304" pitchFamily="18" charset="0"/>
+                      </a:endParaRPr>
+                    </a:p>
+                  </a:txBody>
+                  <a:tcPr marL="68580" marR="68580" marT="0" marB="0"/>
+                </a:tc>
+                <a:tc>
+                  <a:txBody>
+                    <a:bodyPr/>
+                    <a:lstStyle/>
+                    <a:p>
+                      <a:pPr marL="0" marR="0">
+                        <a:lnSpc>
+                          <a:spcPct val="107000"/>
+                        </a:lnSpc>
+                        <a:spcBef>
+                          <a:spcPts val="0"/>
+                        </a:spcBef>
+                        <a:spcAft>
+                          <a:spcPts val="0"/>
+                        </a:spcAft>
+                      </a:pPr>
+                      <a:r>
+                        <a:rPr lang="en-US" sz="1200" dirty="0">
+                          <a:effectLst/>
+                        </a:rPr>
+                        <a:t>Description</a:t>
+                      </a:r>
+                      <a:endParaRPr lang="en-US" sz="1100" dirty="0">
+                        <a:effectLst/>
+                        <a:latin typeface="Calibri" panose="020F0502020204030204" pitchFamily="34" charset="0"/>
+                        <a:ea typeface="Calibri" panose="020F0502020204030204" pitchFamily="34" charset="0"/>
+                        <a:cs typeface="Times New Roman" panose="02020603050405020304" pitchFamily="18" charset="0"/>
+                      </a:endParaRPr>
+                    </a:p>
+                  </a:txBody>
+                  <a:tcPr marL="68580" marR="68580" marT="0" marB="0"/>
+                </a:tc>
+                <a:extLst>
+                  <a:ext uri="{0D108BD9-81ED-4DB2-BD59-A6C34878D82A}">
+                    <a16:rowId xmlns:a16="http://schemas.microsoft.com/office/drawing/2014/main" val="3519254189"/>
+                  </a:ext>
+                </a:extLst>
+              </a:tr>
+              <a:tr h="350584">
+                <a:tc>
+                  <a:txBody>
+                    <a:bodyPr/>
+                    <a:lstStyle/>
+                    <a:p>
+                      <a:pPr marL="0" marR="0" algn="r">
+                        <a:lnSpc>
+                          <a:spcPct val="107000"/>
+                        </a:lnSpc>
+                        <a:spcBef>
+                          <a:spcPts val="0"/>
+                        </a:spcBef>
+                        <a:spcAft>
+                          <a:spcPts val="0"/>
+                        </a:spcAft>
+                      </a:pPr>
+                      <a:r>
+                        <a:rPr lang="en-US" sz="1200">
+                          <a:effectLst/>
+                        </a:rPr>
+                        <a:t>1.0</a:t>
+                      </a:r>
+                      <a:endParaRPr lang="en-US" sz="1100">
+                        <a:effectLst/>
+                        <a:latin typeface="Calibri" panose="020F0502020204030204" pitchFamily="34" charset="0"/>
+                        <a:ea typeface="Calibri" panose="020F0502020204030204" pitchFamily="34" charset="0"/>
+                        <a:cs typeface="Times New Roman" panose="02020603050405020304" pitchFamily="18" charset="0"/>
+                      </a:endParaRPr>
+                    </a:p>
+                  </a:txBody>
+                  <a:tcPr marL="68580" marR="68580" marT="0" marB="0"/>
+                </a:tc>
+                <a:tc>
+                  <a:txBody>
+                    <a:bodyPr/>
+                    <a:lstStyle/>
+                    <a:p>
+                      <a:pPr marL="0" marR="0">
+                        <a:lnSpc>
+                          <a:spcPct val="107000"/>
+                        </a:lnSpc>
+                        <a:spcBef>
+                          <a:spcPts val="0"/>
+                        </a:spcBef>
+                        <a:spcAft>
+                          <a:spcPts val="0"/>
+                        </a:spcAft>
+                      </a:pPr>
+                      <a:r>
+                        <a:rPr lang="en-US" sz="1200">
+                          <a:effectLst/>
+                        </a:rPr>
+                        <a:t>The program shall produce accurate renderings of RSO’s.</a:t>
+                      </a:r>
+                      <a:endParaRPr lang="en-US" sz="1100">
+                        <a:effectLst/>
+                        <a:latin typeface="Calibri" panose="020F0502020204030204" pitchFamily="34" charset="0"/>
+                        <a:ea typeface="Calibri" panose="020F0502020204030204" pitchFamily="34" charset="0"/>
+                        <a:cs typeface="Times New Roman" panose="02020603050405020304" pitchFamily="18" charset="0"/>
+                      </a:endParaRPr>
+                    </a:p>
+                  </a:txBody>
+                  <a:tcPr marL="68580" marR="68580" marT="0" marB="0"/>
+                </a:tc>
+                <a:extLst>
+                  <a:ext uri="{0D108BD9-81ED-4DB2-BD59-A6C34878D82A}">
+                    <a16:rowId xmlns:a16="http://schemas.microsoft.com/office/drawing/2014/main" val="1352006168"/>
+                  </a:ext>
+                </a:extLst>
+              </a:tr>
+              <a:tr h="350584">
+                <a:tc>
+                  <a:txBody>
+                    <a:bodyPr/>
+                    <a:lstStyle/>
+                    <a:p>
+                      <a:pPr marL="0" marR="0" algn="r">
+                        <a:lnSpc>
+                          <a:spcPct val="107000"/>
+                        </a:lnSpc>
+                        <a:spcBef>
+                          <a:spcPts val="0"/>
+                        </a:spcBef>
+                        <a:spcAft>
+                          <a:spcPts val="0"/>
+                        </a:spcAft>
+                      </a:pPr>
+                      <a:r>
+                        <a:rPr lang="en-US" sz="1200">
+                          <a:effectLst/>
+                        </a:rPr>
+                        <a:t>1.1</a:t>
+                      </a:r>
+                      <a:endParaRPr lang="en-US" sz="1100">
+                        <a:effectLst/>
+                        <a:latin typeface="Calibri" panose="020F0502020204030204" pitchFamily="34" charset="0"/>
+                        <a:ea typeface="Calibri" panose="020F0502020204030204" pitchFamily="34" charset="0"/>
+                        <a:cs typeface="Times New Roman" panose="02020603050405020304" pitchFamily="18" charset="0"/>
+                      </a:endParaRPr>
+                    </a:p>
+                  </a:txBody>
+                  <a:tcPr marL="68580" marR="68580" marT="0" marB="0"/>
+                </a:tc>
+                <a:tc>
+                  <a:txBody>
+                    <a:bodyPr/>
+                    <a:lstStyle/>
+                    <a:p>
+                      <a:pPr marL="0" marR="0">
+                        <a:lnSpc>
+                          <a:spcPct val="107000"/>
+                        </a:lnSpc>
+                        <a:spcBef>
+                          <a:spcPts val="0"/>
+                        </a:spcBef>
+                        <a:spcAft>
+                          <a:spcPts val="0"/>
+                        </a:spcAft>
+                      </a:pPr>
+                      <a:r>
+                        <a:rPr lang="en-US" sz="1200">
+                          <a:effectLst/>
+                        </a:rPr>
+                        <a:t>Camera position shall be determined according to the relative locations of the RSO and the telescope.</a:t>
+                      </a:r>
+                      <a:endParaRPr lang="en-US" sz="1100">
+                        <a:effectLst/>
+                        <a:latin typeface="Calibri" panose="020F0502020204030204" pitchFamily="34" charset="0"/>
+                        <a:ea typeface="Calibri" panose="020F0502020204030204" pitchFamily="34" charset="0"/>
+                        <a:cs typeface="Times New Roman" panose="02020603050405020304" pitchFamily="18" charset="0"/>
+                      </a:endParaRPr>
+                    </a:p>
+                  </a:txBody>
+                  <a:tcPr marL="68580" marR="68580" marT="0" marB="0"/>
+                </a:tc>
+                <a:extLst>
+                  <a:ext uri="{0D108BD9-81ED-4DB2-BD59-A6C34878D82A}">
+                    <a16:rowId xmlns:a16="http://schemas.microsoft.com/office/drawing/2014/main" val="2254918573"/>
+                  </a:ext>
+                </a:extLst>
+              </a:tr>
+              <a:tr h="350584">
+                <a:tc>
+                  <a:txBody>
+                    <a:bodyPr/>
+                    <a:lstStyle/>
+                    <a:p>
+                      <a:pPr marL="0" marR="0" algn="r">
+                        <a:lnSpc>
+                          <a:spcPct val="107000"/>
+                        </a:lnSpc>
+                        <a:spcBef>
+                          <a:spcPts val="0"/>
+                        </a:spcBef>
+                        <a:spcAft>
+                          <a:spcPts val="0"/>
+                        </a:spcAft>
+                      </a:pPr>
+                      <a:r>
+                        <a:rPr lang="en-US" sz="1200">
+                          <a:effectLst/>
+                        </a:rPr>
+                        <a:t>1.2</a:t>
+                      </a:r>
+                      <a:endParaRPr lang="en-US" sz="1100">
+                        <a:effectLst/>
+                        <a:latin typeface="Calibri" panose="020F0502020204030204" pitchFamily="34" charset="0"/>
+                        <a:ea typeface="Calibri" panose="020F0502020204030204" pitchFamily="34" charset="0"/>
+                        <a:cs typeface="Times New Roman" panose="02020603050405020304" pitchFamily="18" charset="0"/>
+                      </a:endParaRPr>
+                    </a:p>
+                  </a:txBody>
+                  <a:tcPr marL="68580" marR="68580" marT="0" marB="0"/>
+                </a:tc>
+                <a:tc>
+                  <a:txBody>
+                    <a:bodyPr/>
+                    <a:lstStyle/>
+                    <a:p>
+                      <a:pPr marL="0" marR="0">
+                        <a:lnSpc>
+                          <a:spcPct val="107000"/>
+                        </a:lnSpc>
+                        <a:spcBef>
+                          <a:spcPts val="0"/>
+                        </a:spcBef>
+                        <a:spcAft>
+                          <a:spcPts val="0"/>
+                        </a:spcAft>
+                      </a:pPr>
+                      <a:r>
+                        <a:rPr lang="en-US" sz="1200" dirty="0">
+                          <a:effectLst/>
+                        </a:rPr>
+                        <a:t>An “up-close” rendering mode shall be implemented to produce accurate brightness data.</a:t>
+                      </a:r>
+                      <a:endParaRPr lang="en-US" sz="1100" dirty="0">
+                        <a:effectLst/>
+                        <a:latin typeface="Calibri" panose="020F0502020204030204" pitchFamily="34" charset="0"/>
+                        <a:ea typeface="Calibri" panose="020F0502020204030204" pitchFamily="34" charset="0"/>
+                        <a:cs typeface="Times New Roman" panose="02020603050405020304" pitchFamily="18" charset="0"/>
+                      </a:endParaRPr>
+                    </a:p>
+                  </a:txBody>
+                  <a:tcPr marL="68580" marR="68580" marT="0" marB="0"/>
+                </a:tc>
+                <a:extLst>
+                  <a:ext uri="{0D108BD9-81ED-4DB2-BD59-A6C34878D82A}">
+                    <a16:rowId xmlns:a16="http://schemas.microsoft.com/office/drawing/2014/main" val="1881844857"/>
+                  </a:ext>
+                </a:extLst>
+              </a:tr>
+              <a:tr h="350584">
+                <a:tc>
+                  <a:txBody>
+                    <a:bodyPr/>
+                    <a:lstStyle/>
+                    <a:p>
+                      <a:pPr marL="0" marR="0" algn="r">
+                        <a:lnSpc>
+                          <a:spcPct val="107000"/>
+                        </a:lnSpc>
+                        <a:spcBef>
+                          <a:spcPts val="0"/>
+                        </a:spcBef>
+                        <a:spcAft>
+                          <a:spcPts val="0"/>
+                        </a:spcAft>
+                      </a:pPr>
+                      <a:r>
+                        <a:rPr lang="en-US" sz="1200">
+                          <a:effectLst/>
+                        </a:rPr>
+                        <a:t>1.3</a:t>
+                      </a:r>
+                      <a:endParaRPr lang="en-US" sz="1100">
+                        <a:effectLst/>
+                        <a:latin typeface="Calibri" panose="020F0502020204030204" pitchFamily="34" charset="0"/>
+                        <a:ea typeface="Calibri" panose="020F0502020204030204" pitchFamily="34" charset="0"/>
+                        <a:cs typeface="Times New Roman" panose="02020603050405020304" pitchFamily="18" charset="0"/>
+                      </a:endParaRPr>
+                    </a:p>
+                  </a:txBody>
+                  <a:tcPr marL="68580" marR="68580" marT="0" marB="0"/>
+                </a:tc>
+                <a:tc>
+                  <a:txBody>
+                    <a:bodyPr/>
+                    <a:lstStyle/>
+                    <a:p>
+                      <a:pPr marL="0" marR="0">
+                        <a:lnSpc>
+                          <a:spcPct val="107000"/>
+                        </a:lnSpc>
+                        <a:spcBef>
+                          <a:spcPts val="0"/>
+                        </a:spcBef>
+                        <a:spcAft>
+                          <a:spcPts val="0"/>
+                        </a:spcAft>
+                      </a:pPr>
+                      <a:r>
+                        <a:rPr lang="en-US" sz="1200">
+                          <a:effectLst/>
+                        </a:rPr>
+                        <a:t>A “telescope-view” rendering mode shall be available to simulate actual pass observations.</a:t>
+                      </a:r>
+                      <a:endParaRPr lang="en-US" sz="1100">
+                        <a:effectLst/>
+                        <a:latin typeface="Calibri" panose="020F0502020204030204" pitchFamily="34" charset="0"/>
+                        <a:ea typeface="Calibri" panose="020F0502020204030204" pitchFamily="34" charset="0"/>
+                        <a:cs typeface="Times New Roman" panose="02020603050405020304" pitchFamily="18" charset="0"/>
+                      </a:endParaRPr>
+                    </a:p>
+                  </a:txBody>
+                  <a:tcPr marL="68580" marR="68580" marT="0" marB="0"/>
+                </a:tc>
+                <a:extLst>
+                  <a:ext uri="{0D108BD9-81ED-4DB2-BD59-A6C34878D82A}">
+                    <a16:rowId xmlns:a16="http://schemas.microsoft.com/office/drawing/2014/main" val="104671803"/>
+                  </a:ext>
+                </a:extLst>
+              </a:tr>
+              <a:tr h="350584">
+                <a:tc>
+                  <a:txBody>
+                    <a:bodyPr/>
+                    <a:lstStyle/>
+                    <a:p>
+                      <a:pPr marL="0" marR="0" algn="r">
+                        <a:lnSpc>
+                          <a:spcPct val="107000"/>
+                        </a:lnSpc>
+                        <a:spcBef>
+                          <a:spcPts val="0"/>
+                        </a:spcBef>
+                        <a:spcAft>
+                          <a:spcPts val="0"/>
+                        </a:spcAft>
+                      </a:pPr>
+                      <a:r>
+                        <a:rPr lang="en-US" sz="1200">
+                          <a:effectLst/>
+                        </a:rPr>
+                        <a:t>2.0</a:t>
+                      </a:r>
+                      <a:endParaRPr lang="en-US" sz="1100">
+                        <a:effectLst/>
+                        <a:latin typeface="Calibri" panose="020F0502020204030204" pitchFamily="34" charset="0"/>
+                        <a:ea typeface="Calibri" panose="020F0502020204030204" pitchFamily="34" charset="0"/>
+                        <a:cs typeface="Times New Roman" panose="02020603050405020304" pitchFamily="18" charset="0"/>
+                      </a:endParaRPr>
+                    </a:p>
+                  </a:txBody>
+                  <a:tcPr marL="68580" marR="68580" marT="0" marB="0"/>
+                </a:tc>
+                <a:tc>
+                  <a:txBody>
+                    <a:bodyPr/>
+                    <a:lstStyle/>
+                    <a:p>
+                      <a:pPr marL="0" marR="0">
+                        <a:lnSpc>
+                          <a:spcPct val="107000"/>
+                        </a:lnSpc>
+                        <a:spcBef>
+                          <a:spcPts val="0"/>
+                        </a:spcBef>
+                        <a:spcAft>
+                          <a:spcPts val="0"/>
+                        </a:spcAft>
+                      </a:pPr>
+                      <a:r>
+                        <a:rPr lang="en-US" sz="1200">
+                          <a:effectLst/>
+                        </a:rPr>
+                        <a:t>The program shall generate accurate photometry curves from simulated RSO passes.</a:t>
+                      </a:r>
+                      <a:endParaRPr lang="en-US" sz="1100">
+                        <a:effectLst/>
+                        <a:latin typeface="Calibri" panose="020F0502020204030204" pitchFamily="34" charset="0"/>
+                        <a:ea typeface="Calibri" panose="020F0502020204030204" pitchFamily="34" charset="0"/>
+                        <a:cs typeface="Times New Roman" panose="02020603050405020304" pitchFamily="18" charset="0"/>
+                      </a:endParaRPr>
+                    </a:p>
+                  </a:txBody>
+                  <a:tcPr marL="68580" marR="68580" marT="0" marB="0"/>
+                </a:tc>
+                <a:extLst>
+                  <a:ext uri="{0D108BD9-81ED-4DB2-BD59-A6C34878D82A}">
+                    <a16:rowId xmlns:a16="http://schemas.microsoft.com/office/drawing/2014/main" val="2127185484"/>
+                  </a:ext>
+                </a:extLst>
+              </a:tr>
+              <a:tr h="350584">
+                <a:tc>
+                  <a:txBody>
+                    <a:bodyPr/>
+                    <a:lstStyle/>
+                    <a:p>
+                      <a:pPr marL="0" marR="0" algn="r">
+                        <a:lnSpc>
+                          <a:spcPct val="107000"/>
+                        </a:lnSpc>
+                        <a:spcBef>
+                          <a:spcPts val="0"/>
+                        </a:spcBef>
+                        <a:spcAft>
+                          <a:spcPts val="0"/>
+                        </a:spcAft>
+                      </a:pPr>
+                      <a:r>
+                        <a:rPr lang="en-US" sz="1200">
+                          <a:effectLst/>
+                        </a:rPr>
+                        <a:t>3.0</a:t>
+                      </a:r>
+                      <a:endParaRPr lang="en-US" sz="1100">
+                        <a:effectLst/>
+                        <a:latin typeface="Calibri" panose="020F0502020204030204" pitchFamily="34" charset="0"/>
+                        <a:ea typeface="Calibri" panose="020F0502020204030204" pitchFamily="34" charset="0"/>
+                        <a:cs typeface="Times New Roman" panose="02020603050405020304" pitchFamily="18" charset="0"/>
+                      </a:endParaRPr>
+                    </a:p>
+                  </a:txBody>
+                  <a:tcPr marL="68580" marR="68580" marT="0" marB="0"/>
+                </a:tc>
+                <a:tc>
+                  <a:txBody>
+                    <a:bodyPr/>
+                    <a:lstStyle/>
+                    <a:p>
+                      <a:pPr marL="0" marR="0">
+                        <a:lnSpc>
+                          <a:spcPct val="107000"/>
+                        </a:lnSpc>
+                        <a:spcBef>
+                          <a:spcPts val="0"/>
+                        </a:spcBef>
+                        <a:spcAft>
+                          <a:spcPts val="0"/>
+                        </a:spcAft>
+                      </a:pPr>
+                      <a:r>
+                        <a:rPr lang="en-US" sz="1200">
+                          <a:effectLst/>
+                        </a:rPr>
+                        <a:t>The program shall reconstruct the attitude of an RSO given its shape and photometry data.</a:t>
+                      </a:r>
+                      <a:endParaRPr lang="en-US" sz="1100">
+                        <a:effectLst/>
+                        <a:latin typeface="Calibri" panose="020F0502020204030204" pitchFamily="34" charset="0"/>
+                        <a:ea typeface="Calibri" panose="020F0502020204030204" pitchFamily="34" charset="0"/>
+                        <a:cs typeface="Times New Roman" panose="02020603050405020304" pitchFamily="18" charset="0"/>
+                      </a:endParaRPr>
+                    </a:p>
+                  </a:txBody>
+                  <a:tcPr marL="68580" marR="68580" marT="0" marB="0"/>
+                </a:tc>
+                <a:extLst>
+                  <a:ext uri="{0D108BD9-81ED-4DB2-BD59-A6C34878D82A}">
+                    <a16:rowId xmlns:a16="http://schemas.microsoft.com/office/drawing/2014/main" val="3091285529"/>
+                  </a:ext>
+                </a:extLst>
+              </a:tr>
+              <a:tr h="350584">
+                <a:tc>
+                  <a:txBody>
+                    <a:bodyPr/>
+                    <a:lstStyle/>
+                    <a:p>
+                      <a:pPr marL="0" marR="0" algn="r">
+                        <a:lnSpc>
+                          <a:spcPct val="107000"/>
+                        </a:lnSpc>
+                        <a:spcBef>
+                          <a:spcPts val="0"/>
+                        </a:spcBef>
+                        <a:spcAft>
+                          <a:spcPts val="0"/>
+                        </a:spcAft>
+                      </a:pPr>
+                      <a:r>
+                        <a:rPr lang="en-US" sz="1200">
+                          <a:effectLst/>
+                        </a:rPr>
+                        <a:t>4.0</a:t>
+                      </a:r>
+                      <a:endParaRPr lang="en-US" sz="1100">
+                        <a:effectLst/>
+                        <a:latin typeface="Calibri" panose="020F0502020204030204" pitchFamily="34" charset="0"/>
+                        <a:ea typeface="Calibri" panose="020F0502020204030204" pitchFamily="34" charset="0"/>
+                        <a:cs typeface="Times New Roman" panose="02020603050405020304" pitchFamily="18" charset="0"/>
+                      </a:endParaRPr>
+                    </a:p>
+                  </a:txBody>
+                  <a:tcPr marL="68580" marR="68580" marT="0" marB="0"/>
+                </a:tc>
+                <a:tc>
+                  <a:txBody>
+                    <a:bodyPr/>
+                    <a:lstStyle/>
+                    <a:p>
+                      <a:pPr marL="0" marR="0">
+                        <a:lnSpc>
+                          <a:spcPct val="107000"/>
+                        </a:lnSpc>
+                        <a:spcBef>
+                          <a:spcPts val="0"/>
+                        </a:spcBef>
+                        <a:spcAft>
+                          <a:spcPts val="0"/>
+                        </a:spcAft>
+                      </a:pPr>
+                      <a:r>
+                        <a:rPr lang="en-US" sz="1200">
+                          <a:effectLst/>
+                        </a:rPr>
+                        <a:t>The program shall provide a graphical user interface.</a:t>
+                      </a:r>
+                      <a:endParaRPr lang="en-US" sz="1100">
+                        <a:effectLst/>
+                        <a:latin typeface="Calibri" panose="020F0502020204030204" pitchFamily="34" charset="0"/>
+                        <a:ea typeface="Calibri" panose="020F0502020204030204" pitchFamily="34" charset="0"/>
+                        <a:cs typeface="Times New Roman" panose="02020603050405020304" pitchFamily="18" charset="0"/>
+                      </a:endParaRPr>
+                    </a:p>
+                  </a:txBody>
+                  <a:tcPr marL="68580" marR="68580" marT="0" marB="0"/>
+                </a:tc>
+                <a:extLst>
+                  <a:ext uri="{0D108BD9-81ED-4DB2-BD59-A6C34878D82A}">
+                    <a16:rowId xmlns:a16="http://schemas.microsoft.com/office/drawing/2014/main" val="3497844220"/>
+                  </a:ext>
+                </a:extLst>
+              </a:tr>
+              <a:tr h="350584">
+                <a:tc>
+                  <a:txBody>
+                    <a:bodyPr/>
+                    <a:lstStyle/>
+                    <a:p>
+                      <a:pPr marL="0" marR="0" algn="r">
+                        <a:lnSpc>
+                          <a:spcPct val="107000"/>
+                        </a:lnSpc>
+                        <a:spcBef>
+                          <a:spcPts val="0"/>
+                        </a:spcBef>
+                        <a:spcAft>
+                          <a:spcPts val="0"/>
+                        </a:spcAft>
+                      </a:pPr>
+                      <a:r>
+                        <a:rPr lang="en-US" sz="1200">
+                          <a:effectLst/>
+                        </a:rPr>
+                        <a:t>4.1</a:t>
+                      </a:r>
+                      <a:endParaRPr lang="en-US" sz="1100">
+                        <a:effectLst/>
+                        <a:latin typeface="Calibri" panose="020F0502020204030204" pitchFamily="34" charset="0"/>
+                        <a:ea typeface="Calibri" panose="020F0502020204030204" pitchFamily="34" charset="0"/>
+                        <a:cs typeface="Times New Roman" panose="02020603050405020304" pitchFamily="18" charset="0"/>
+                      </a:endParaRPr>
+                    </a:p>
+                  </a:txBody>
+                  <a:tcPr marL="68580" marR="68580" marT="0" marB="0"/>
+                </a:tc>
+                <a:tc>
+                  <a:txBody>
+                    <a:bodyPr/>
+                    <a:lstStyle/>
+                    <a:p>
+                      <a:pPr marL="0" marR="0">
+                        <a:lnSpc>
+                          <a:spcPct val="107000"/>
+                        </a:lnSpc>
+                        <a:spcBef>
+                          <a:spcPts val="0"/>
+                        </a:spcBef>
+                        <a:spcAft>
+                          <a:spcPts val="0"/>
+                        </a:spcAft>
+                      </a:pPr>
+                      <a:r>
+                        <a:rPr lang="en-US" sz="1200">
+                          <a:effectLst/>
+                        </a:rPr>
+                        <a:t>The GUI shall be created with QT.</a:t>
+                      </a:r>
+                      <a:endParaRPr lang="en-US" sz="1100">
+                        <a:effectLst/>
+                        <a:latin typeface="Calibri" panose="020F0502020204030204" pitchFamily="34" charset="0"/>
+                        <a:ea typeface="Calibri" panose="020F0502020204030204" pitchFamily="34" charset="0"/>
+                        <a:cs typeface="Times New Roman" panose="02020603050405020304" pitchFamily="18" charset="0"/>
+                      </a:endParaRPr>
+                    </a:p>
+                  </a:txBody>
+                  <a:tcPr marL="68580" marR="68580" marT="0" marB="0"/>
+                </a:tc>
+                <a:extLst>
+                  <a:ext uri="{0D108BD9-81ED-4DB2-BD59-A6C34878D82A}">
+                    <a16:rowId xmlns:a16="http://schemas.microsoft.com/office/drawing/2014/main" val="4036849897"/>
+                  </a:ext>
+                </a:extLst>
+              </a:tr>
+              <a:tr h="350584">
+                <a:tc>
+                  <a:txBody>
+                    <a:bodyPr/>
+                    <a:lstStyle/>
+                    <a:p>
+                      <a:pPr marL="0" marR="0" algn="r">
+                        <a:lnSpc>
+                          <a:spcPct val="107000"/>
+                        </a:lnSpc>
+                        <a:spcBef>
+                          <a:spcPts val="0"/>
+                        </a:spcBef>
+                        <a:spcAft>
+                          <a:spcPts val="0"/>
+                        </a:spcAft>
+                      </a:pPr>
+                      <a:r>
+                        <a:rPr lang="en-US" sz="1200">
+                          <a:effectLst/>
+                        </a:rPr>
+                        <a:t>4.2</a:t>
+                      </a:r>
+                      <a:endParaRPr lang="en-US" sz="1100">
+                        <a:effectLst/>
+                        <a:latin typeface="Calibri" panose="020F0502020204030204" pitchFamily="34" charset="0"/>
+                        <a:ea typeface="Calibri" panose="020F0502020204030204" pitchFamily="34" charset="0"/>
+                        <a:cs typeface="Times New Roman" panose="02020603050405020304" pitchFamily="18" charset="0"/>
+                      </a:endParaRPr>
+                    </a:p>
+                  </a:txBody>
+                  <a:tcPr marL="68580" marR="68580" marT="0" marB="0"/>
+                </a:tc>
+                <a:tc>
+                  <a:txBody>
+                    <a:bodyPr/>
+                    <a:lstStyle/>
+                    <a:p>
+                      <a:pPr marL="0" marR="0">
+                        <a:lnSpc>
+                          <a:spcPct val="107000"/>
+                        </a:lnSpc>
+                        <a:spcBef>
+                          <a:spcPts val="0"/>
+                        </a:spcBef>
+                        <a:spcAft>
+                          <a:spcPts val="0"/>
+                        </a:spcAft>
+                      </a:pPr>
+                      <a:r>
+                        <a:rPr lang="en-US" sz="1200" dirty="0">
+                          <a:effectLst/>
+                        </a:rPr>
+                        <a:t>The GUI shall provide a render mode to view the RSO renderings.</a:t>
+                      </a:r>
+                      <a:endParaRPr lang="en-US" sz="1100" dirty="0">
+                        <a:effectLst/>
+                        <a:latin typeface="Calibri" panose="020F0502020204030204" pitchFamily="34" charset="0"/>
+                        <a:ea typeface="Calibri" panose="020F0502020204030204" pitchFamily="34" charset="0"/>
+                        <a:cs typeface="Times New Roman" panose="02020603050405020304" pitchFamily="18" charset="0"/>
+                      </a:endParaRPr>
+                    </a:p>
+                  </a:txBody>
+                  <a:tcPr marL="68580" marR="68580" marT="0" marB="0"/>
+                </a:tc>
+                <a:extLst>
+                  <a:ext uri="{0D108BD9-81ED-4DB2-BD59-A6C34878D82A}">
+                    <a16:rowId xmlns:a16="http://schemas.microsoft.com/office/drawing/2014/main" val="1444455300"/>
+                  </a:ext>
+                </a:extLst>
+              </a:tr>
+              <a:tr h="350584">
+                <a:tc>
+                  <a:txBody>
+                    <a:bodyPr/>
+                    <a:lstStyle/>
+                    <a:p>
+                      <a:pPr marL="0" marR="0" algn="r">
+                        <a:lnSpc>
+                          <a:spcPct val="107000"/>
+                        </a:lnSpc>
+                        <a:spcBef>
+                          <a:spcPts val="0"/>
+                        </a:spcBef>
+                        <a:spcAft>
+                          <a:spcPts val="0"/>
+                        </a:spcAft>
+                      </a:pPr>
+                      <a:r>
+                        <a:rPr lang="en-US" sz="1200">
+                          <a:effectLst/>
+                        </a:rPr>
+                        <a:t>4.3</a:t>
+                      </a:r>
+                      <a:endParaRPr lang="en-US" sz="1100">
+                        <a:effectLst/>
+                        <a:latin typeface="Calibri" panose="020F0502020204030204" pitchFamily="34" charset="0"/>
+                        <a:ea typeface="Calibri" panose="020F0502020204030204" pitchFamily="34" charset="0"/>
+                        <a:cs typeface="Times New Roman" panose="02020603050405020304" pitchFamily="18" charset="0"/>
+                      </a:endParaRPr>
+                    </a:p>
+                  </a:txBody>
+                  <a:tcPr marL="68580" marR="68580" marT="0" marB="0"/>
+                </a:tc>
+                <a:tc>
+                  <a:txBody>
+                    <a:bodyPr/>
+                    <a:lstStyle/>
+                    <a:p>
+                      <a:pPr marL="0" marR="0">
+                        <a:lnSpc>
+                          <a:spcPct val="107000"/>
+                        </a:lnSpc>
+                        <a:spcBef>
+                          <a:spcPts val="0"/>
+                        </a:spcBef>
+                        <a:spcAft>
+                          <a:spcPts val="0"/>
+                        </a:spcAft>
+                      </a:pPr>
+                      <a:r>
+                        <a:rPr lang="en-US" sz="1200" dirty="0">
+                          <a:effectLst/>
+                        </a:rPr>
+                        <a:t>The GUI shall provide a graph mode to view photometry data independently.</a:t>
+                      </a:r>
+                      <a:endParaRPr lang="en-US" sz="1100" dirty="0">
+                        <a:effectLst/>
+                        <a:latin typeface="Calibri" panose="020F0502020204030204" pitchFamily="34" charset="0"/>
+                        <a:ea typeface="Calibri" panose="020F0502020204030204" pitchFamily="34" charset="0"/>
+                        <a:cs typeface="Times New Roman" panose="02020603050405020304" pitchFamily="18" charset="0"/>
+                      </a:endParaRPr>
+                    </a:p>
+                  </a:txBody>
+                  <a:tcPr marL="68580" marR="68580" marT="0" marB="0"/>
+                </a:tc>
+                <a:extLst>
+                  <a:ext uri="{0D108BD9-81ED-4DB2-BD59-A6C34878D82A}">
+                    <a16:rowId xmlns:a16="http://schemas.microsoft.com/office/drawing/2014/main" val="3361654822"/>
+                  </a:ext>
+                </a:extLst>
+              </a:tr>
+            </a:tbl>
+          </a:graphicData>
+        </a:graphic>
+      </p:graphicFrame>
     </p:spTree>
     <p:extLst>
       <p:ext uri="{BB962C8B-B14F-4D97-AF65-F5344CB8AC3E}">

</xml_diff>

<commit_message>
Update UI Layout messing with OpenGL code
</commit_message>
<xml_diff>
--- a/documentation/COMPASS Project Overview.pptx
+++ b/documentation/COMPASS Project Overview.pptx
@@ -206,7 +206,7 @@
           <a:p>
             <a:fld id="{D059CC2D-C996-4891-89D6-DDA04078794E}" type="datetimeFigureOut">
               <a:rPr lang="en-US" smtClean="0"/>
-              <a:t>8/12/2017</a:t>
+              <a:t>8/15/2017</a:t>
             </a:fld>
             <a:endParaRPr lang="en-US"/>
           </a:p>
@@ -688,7 +688,7 @@
           <a:p>
             <a:fld id="{C4771BD2-2EDC-4A32-BF37-6474222A526D}" type="datetimeFigureOut">
               <a:rPr lang="en-US" smtClean="0"/>
-              <a:t>8/12/2017</a:t>
+              <a:t>8/15/2017</a:t>
             </a:fld>
             <a:endParaRPr lang="en-US"/>
           </a:p>
@@ -858,7 +858,7 @@
           <a:p>
             <a:fld id="{C4771BD2-2EDC-4A32-BF37-6474222A526D}" type="datetimeFigureOut">
               <a:rPr lang="en-US" smtClean="0"/>
-              <a:t>8/12/2017</a:t>
+              <a:t>8/15/2017</a:t>
             </a:fld>
             <a:endParaRPr lang="en-US"/>
           </a:p>
@@ -1038,7 +1038,7 @@
           <a:p>
             <a:fld id="{C4771BD2-2EDC-4A32-BF37-6474222A526D}" type="datetimeFigureOut">
               <a:rPr lang="en-US" smtClean="0"/>
-              <a:t>8/12/2017</a:t>
+              <a:t>8/15/2017</a:t>
             </a:fld>
             <a:endParaRPr lang="en-US"/>
           </a:p>
@@ -1208,7 +1208,7 @@
           <a:p>
             <a:fld id="{C4771BD2-2EDC-4A32-BF37-6474222A526D}" type="datetimeFigureOut">
               <a:rPr lang="en-US" smtClean="0"/>
-              <a:t>8/12/2017</a:t>
+              <a:t>8/15/2017</a:t>
             </a:fld>
             <a:endParaRPr lang="en-US"/>
           </a:p>
@@ -1454,7 +1454,7 @@
           <a:p>
             <a:fld id="{C4771BD2-2EDC-4A32-BF37-6474222A526D}" type="datetimeFigureOut">
               <a:rPr lang="en-US" smtClean="0"/>
-              <a:t>8/12/2017</a:t>
+              <a:t>8/15/2017</a:t>
             </a:fld>
             <a:endParaRPr lang="en-US"/>
           </a:p>
@@ -1686,7 +1686,7 @@
           <a:p>
             <a:fld id="{C4771BD2-2EDC-4A32-BF37-6474222A526D}" type="datetimeFigureOut">
               <a:rPr lang="en-US" smtClean="0"/>
-              <a:t>8/12/2017</a:t>
+              <a:t>8/15/2017</a:t>
             </a:fld>
             <a:endParaRPr lang="en-US"/>
           </a:p>
@@ -2053,7 +2053,7 @@
           <a:p>
             <a:fld id="{C4771BD2-2EDC-4A32-BF37-6474222A526D}" type="datetimeFigureOut">
               <a:rPr lang="en-US" smtClean="0"/>
-              <a:t>8/12/2017</a:t>
+              <a:t>8/15/2017</a:t>
             </a:fld>
             <a:endParaRPr lang="en-US"/>
           </a:p>
@@ -2171,7 +2171,7 @@
           <a:p>
             <a:fld id="{C4771BD2-2EDC-4A32-BF37-6474222A526D}" type="datetimeFigureOut">
               <a:rPr lang="en-US" smtClean="0"/>
-              <a:t>8/12/2017</a:t>
+              <a:t>8/15/2017</a:t>
             </a:fld>
             <a:endParaRPr lang="en-US"/>
           </a:p>
@@ -2266,7 +2266,7 @@
           <a:p>
             <a:fld id="{C4771BD2-2EDC-4A32-BF37-6474222A526D}" type="datetimeFigureOut">
               <a:rPr lang="en-US" smtClean="0"/>
-              <a:t>8/12/2017</a:t>
+              <a:t>8/15/2017</a:t>
             </a:fld>
             <a:endParaRPr lang="en-US"/>
           </a:p>
@@ -2543,7 +2543,7 @@
           <a:p>
             <a:fld id="{C4771BD2-2EDC-4A32-BF37-6474222A526D}" type="datetimeFigureOut">
               <a:rPr lang="en-US" smtClean="0"/>
-              <a:t>8/12/2017</a:t>
+              <a:t>8/15/2017</a:t>
             </a:fld>
             <a:endParaRPr lang="en-US"/>
           </a:p>
@@ -2800,7 +2800,7 @@
           <a:p>
             <a:fld id="{C4771BD2-2EDC-4A32-BF37-6474222A526D}" type="datetimeFigureOut">
               <a:rPr lang="en-US" smtClean="0"/>
-              <a:t>8/12/2017</a:t>
+              <a:t>8/15/2017</a:t>
             </a:fld>
             <a:endParaRPr lang="en-US"/>
           </a:p>
@@ -3013,7 +3013,7 @@
           <a:p>
             <a:fld id="{C4771BD2-2EDC-4A32-BF37-6474222A526D}" type="datetimeFigureOut">
               <a:rPr lang="en-US" smtClean="0"/>
-              <a:t>8/12/2017</a:t>
+              <a:t>8/15/2017</a:t>
             </a:fld>
             <a:endParaRPr lang="en-US"/>
           </a:p>
@@ -3629,7 +3629,7 @@
             </a:r>
             <a:r>
               <a:rPr lang="en-US" dirty="0"/>
-              <a:t>hotometric-Characterizer/Analyzer for </a:t>
+              <a:t>hotometry </a:t>
             </a:r>
             <a:r>
               <a:rPr lang="en-US" b="1" dirty="0"/>
@@ -3637,7 +3637,7 @@
             </a:r>
             <a:r>
               <a:rPr lang="en-US" dirty="0"/>
-              <a:t>rtificial </a:t>
+              <a:t>nalyzer for </a:t>
             </a:r>
             <a:r>
               <a:rPr lang="en-US" b="1" dirty="0"/>
@@ -3645,15 +3645,15 @@
             </a:r>
             <a:r>
               <a:rPr lang="en-US" dirty="0"/>
-              <a:t>atellite</a:t>
+              <a:t>mall </a:t>
             </a:r>
             <a:r>
               <a:rPr lang="en-US" b="1" dirty="0"/>
-              <a:t>s</a:t>
+              <a:t>S</a:t>
             </a:r>
             <a:r>
               <a:rPr lang="en-US" dirty="0"/>
-              <a:t> (COMPASS) is a desktop-based rendering engine written in C++ and OpenGL to produce highly accurate graphical representations of RSOs (resident space objects) and their environments as observed by ground-based telescopes. These renderings are generated and processed within the program in order to infer additional information about the system (photometry curve, attitude, rotation, etc.) and provide the user with a convenient and intuitive interface which can be used to visualize the RSO and directly correlate these visualizations to photometry data within the simulations.</a:t>
+              <a:t>atellites(COMPASS) is a desktop-based rendering engine written in C++ and OpenGL used to produce accurate graphical representations of RSOs (resident space objects) and their environments as observed by ground-based telescopes. These renderings are generated and processed within the program in order to infer additional information about the system including photometry data, RSO attitude, rotation frequency, etc. and provide a platform for testing image processing algorithms. An intuitive user interface is provided in order to visually correlate these renderings to the associated photometry data.</a:t>
             </a:r>
           </a:p>
         </p:txBody>

</xml_diff>